<commit_message>
Wrote notes for Switch lecture, updated slides
</commit_message>
<xml_diff>
--- a/lectures/100_switch/Switch.pptx
+++ b/lectures/100_switch/Switch.pptx
@@ -5,10 +5,10 @@
     <p:sldMasterId id="2147483732" r:id="rId1"/>
   </p:sldMasterIdLst>
   <p:notesMasterIdLst>
-    <p:notesMasterId r:id="rId17"/>
+    <p:notesMasterId r:id="rId18"/>
   </p:notesMasterIdLst>
   <p:handoutMasterIdLst>
-    <p:handoutMasterId r:id="rId18"/>
+    <p:handoutMasterId r:id="rId19"/>
   </p:handoutMasterIdLst>
   <p:sldIdLst>
     <p:sldId id="256" r:id="rId2"/>
@@ -21,11 +21,12 @@
     <p:sldId id="382" r:id="rId9"/>
     <p:sldId id="384" r:id="rId10"/>
     <p:sldId id="390" r:id="rId11"/>
-    <p:sldId id="385" r:id="rId12"/>
-    <p:sldId id="386" r:id="rId13"/>
-    <p:sldId id="387" r:id="rId14"/>
-    <p:sldId id="388" r:id="rId15"/>
-    <p:sldId id="389" r:id="rId16"/>
+    <p:sldId id="391" r:id="rId12"/>
+    <p:sldId id="385" r:id="rId13"/>
+    <p:sldId id="386" r:id="rId14"/>
+    <p:sldId id="387" r:id="rId15"/>
+    <p:sldId id="388" r:id="rId16"/>
+    <p:sldId id="389" r:id="rId17"/>
   </p:sldIdLst>
   <p:sldSz cx="12188825" cy="6858000"/>
   <p:notesSz cx="6858000" cy="9144000"/>
@@ -251,7 +252,7 @@
           <a:p>
             <a:fld id="{2507D560-C4D4-4804-8CBF-2C56AB6C6DB9}" type="datetimeFigureOut">
               <a:rPr lang="en-US" smtClean="0"/>
-              <a:t>6/14/2021</a:t>
+              <a:t>6/16/2021</a:t>
             </a:fld>
             <a:endParaRPr lang="en-US"/>
           </a:p>
@@ -416,7 +417,7 @@
           <a:p>
             <a:fld id="{688E7586-9A7B-41FF-B169-85DADA744493}" type="datetimeFigureOut">
               <a:rPr lang="en-US" smtClean="0"/>
-              <a:t>6/14/2021</a:t>
+              <a:t>6/16/2021</a:t>
             </a:fld>
             <a:endParaRPr lang="en-US"/>
           </a:p>
@@ -4811,7 +4812,7 @@
           <p:cNvPr id="2" name="Title 1">
             <a:extLst>
               <a:ext uri="{FF2B5EF4-FFF2-40B4-BE49-F238E27FC236}">
-                <a16:creationId xmlns:a16="http://schemas.microsoft.com/office/drawing/2014/main" id="{42F1B814-6282-4075-A22A-DC3ABFDC9ED3}"/>
+                <a16:creationId xmlns:a16="http://schemas.microsoft.com/office/drawing/2014/main" id="{5DACEC71-9D33-47D5-9B42-43D1B2A50CE0}"/>
               </a:ext>
             </a:extLst>
           </p:cNvPr>
@@ -4829,7 +4830,7 @@
           <a:p>
             <a:r>
               <a:rPr lang="en-US" dirty="0"/>
-              <a:t>Outline</a:t>
+              <a:t>Limitations of Switch</a:t>
             </a:r>
           </a:p>
         </p:txBody>
@@ -4839,7 +4840,7 @@
           <p:cNvPr id="3" name="Content Placeholder 2">
             <a:extLst>
               <a:ext uri="{FF2B5EF4-FFF2-40B4-BE49-F238E27FC236}">
-                <a16:creationId xmlns:a16="http://schemas.microsoft.com/office/drawing/2014/main" id="{A21C63A1-E39A-4E80-92B5-E2FCBFF8D55C}"/>
+                <a16:creationId xmlns:a16="http://schemas.microsoft.com/office/drawing/2014/main" id="{D3A88992-1D1D-4D44-901F-E20A63B8AE9B}"/>
               </a:ext>
             </a:extLst>
           </p:cNvPr>
@@ -4850,21 +4851,51 @@
             <p:ph idx="1"/>
           </p:nvPr>
         </p:nvSpPr>
-        <p:spPr/>
+        <p:spPr>
+          <a:xfrm>
+            <a:off x="227013" y="1371600"/>
+            <a:ext cx="11734800" cy="1219200"/>
+          </a:xfrm>
+        </p:spPr>
         <p:txBody>
           <a:bodyPr/>
           <a:lstStyle/>
           <a:p>
             <a:r>
               <a:rPr lang="en-US" dirty="0"/>
-              <a:t>Switch statements</a:t>
-            </a:r>
-          </a:p>
-          <a:p>
-            <a:r>
-              <a:rPr lang="en-US" b="1" dirty="0"/>
-              <a:t>Conditional operator</a:t>
-            </a:r>
+              <a:t>Not all </a:t>
+            </a:r>
+            <a:r>
+              <a:rPr lang="en-US" dirty="0">
+                <a:latin typeface="Consolas" panose="020B0609020204030204" pitchFamily="49" charset="0"/>
+              </a:rPr>
+              <a:t>if-else-if</a:t>
+            </a:r>
+            <a:r>
+              <a:rPr lang="en-US" dirty="0"/>
+              <a:t> statements can be written with </a:t>
+            </a:r>
+            <a:r>
+              <a:rPr lang="en-US" dirty="0">
+                <a:latin typeface="Consolas" panose="020B0609020204030204" pitchFamily="49" charset="0"/>
+              </a:rPr>
+              <a:t>switch</a:t>
+            </a:r>
+          </a:p>
+          <a:p>
+            <a:r>
+              <a:rPr lang="en-US" dirty="0">
+                <a:latin typeface="Consolas" panose="020B0609020204030204" pitchFamily="49" charset="0"/>
+              </a:rPr>
+              <a:t>switch</a:t>
+            </a:r>
+            <a:r>
+              <a:rPr lang="en-US" dirty="0"/>
+              <a:t> can only test equality, not inequality/ranges</a:t>
+            </a:r>
+            <a:endParaRPr lang="en-US" dirty="0">
+              <a:latin typeface="Consolas" panose="020B0609020204030204" pitchFamily="49" charset="0"/>
+            </a:endParaRPr>
           </a:p>
         </p:txBody>
       </p:sp>
@@ -4873,7 +4904,7 @@
           <p:cNvPr id="4" name="Footer Placeholder 3">
             <a:extLst>
               <a:ext uri="{FF2B5EF4-FFF2-40B4-BE49-F238E27FC236}">
-                <a16:creationId xmlns:a16="http://schemas.microsoft.com/office/drawing/2014/main" id="{C185642E-D901-43E9-B9EC-3B1DBFC4E326}"/>
+                <a16:creationId xmlns:a16="http://schemas.microsoft.com/office/drawing/2014/main" id="{439FF4A5-AA98-460D-9112-F1BC44D99479}"/>
               </a:ext>
             </a:extLst>
           </p:cNvPr>
@@ -4896,16 +4927,772 @@
           </a:p>
         </p:txBody>
       </p:sp>
+      <p:sp>
+        <p:nvSpPr>
+          <p:cNvPr id="5" name="TextBox 4">
+            <a:extLst>
+              <a:ext uri="{FF2B5EF4-FFF2-40B4-BE49-F238E27FC236}">
+                <a16:creationId xmlns:a16="http://schemas.microsoft.com/office/drawing/2014/main" id="{FC807D60-0931-46C5-B764-1EDC029A17B9}"/>
+              </a:ext>
+            </a:extLst>
+          </p:cNvPr>
+          <p:cNvSpPr txBox="1"/>
+          <p:nvPr/>
+        </p:nvSpPr>
+        <p:spPr>
+          <a:xfrm>
+            <a:off x="945278" y="3007968"/>
+            <a:ext cx="3657600" cy="2862322"/>
+          </a:xfrm>
+          <a:prstGeom prst="rect">
+            <a:avLst/>
+          </a:prstGeom>
+          <a:solidFill>
+            <a:schemeClr val="bg1">
+              <a:lumMod val="85000"/>
+              <a:lumOff val="15000"/>
+            </a:schemeClr>
+          </a:solidFill>
+        </p:spPr>
+        <p:txBody>
+          <a:bodyPr wrap="square" rtlCol="0">
+            <a:spAutoFit/>
+          </a:bodyPr>
+          <a:lstStyle>
+            <a:defPPr>
+              <a:defRPr lang="en-US"/>
+            </a:defPPr>
+            <a:lvl1pPr>
+              <a:defRPr sz="2200">
+                <a:solidFill>
+                  <a:srgbClr val="0099FF"/>
+                </a:solidFill>
+                <a:latin typeface="Consolas" panose="020B0609020204030204" pitchFamily="49" charset="0"/>
+              </a:defRPr>
+            </a:lvl1pPr>
+          </a:lstStyle>
+          <a:p>
+            <a:r>
+              <a:rPr lang="en-US" sz="2000" dirty="0"/>
+              <a:t>decimal </a:t>
+            </a:r>
+            <a:r>
+              <a:rPr lang="en-US" sz="2000" dirty="0">
+                <a:solidFill>
+                  <a:schemeClr val="tx1"/>
+                </a:solidFill>
+              </a:rPr>
+              <a:t>fee = </a:t>
+            </a:r>
+            <a:r>
+              <a:rPr lang="en-US" sz="2000" dirty="0">
+                <a:solidFill>
+                  <a:srgbClr val="99CC00"/>
+                </a:solidFill>
+              </a:rPr>
+              <a:t>0</a:t>
+            </a:r>
+            <a:r>
+              <a:rPr lang="en-US" sz="2000" dirty="0">
+                <a:solidFill>
+                  <a:schemeClr val="tx1"/>
+                </a:solidFill>
+              </a:rPr>
+              <a:t>;</a:t>
+            </a:r>
+          </a:p>
+          <a:p>
+            <a:r>
+              <a:rPr lang="en-US" sz="2000" dirty="0"/>
+              <a:t>if</a:t>
+            </a:r>
+            <a:r>
+              <a:rPr lang="en-US" sz="2000" dirty="0">
+                <a:solidFill>
+                  <a:schemeClr val="tx1"/>
+                </a:solidFill>
+              </a:rPr>
+              <a:t>(mileage &gt; </a:t>
+            </a:r>
+            <a:r>
+              <a:rPr lang="en-US" sz="2000" dirty="0">
+                <a:solidFill>
+                  <a:srgbClr val="99CC00"/>
+                </a:solidFill>
+              </a:rPr>
+              <a:t>1000</a:t>
+            </a:r>
+            <a:r>
+              <a:rPr lang="en-US" sz="2000" dirty="0">
+                <a:solidFill>
+                  <a:schemeClr val="tx1"/>
+                </a:solidFill>
+              </a:rPr>
+              <a:t>)</a:t>
+            </a:r>
+          </a:p>
+          <a:p>
+            <a:r>
+              <a:rPr lang="en-US" sz="2000" dirty="0">
+                <a:solidFill>
+                  <a:schemeClr val="tx1"/>
+                </a:solidFill>
+              </a:rPr>
+              <a:t>{</a:t>
+            </a:r>
+          </a:p>
+          <a:p>
+            <a:r>
+              <a:rPr lang="en-US" sz="2000" dirty="0">
+                <a:solidFill>
+                  <a:schemeClr val="tx1"/>
+                </a:solidFill>
+              </a:rPr>
+              <a:t>  fee = </a:t>
+            </a:r>
+            <a:r>
+              <a:rPr lang="en-US" sz="2000" dirty="0">
+                <a:solidFill>
+                  <a:srgbClr val="99CC00"/>
+                </a:solidFill>
+              </a:rPr>
+              <a:t>50.0M</a:t>
+            </a:r>
+            <a:r>
+              <a:rPr lang="en-US" sz="2000" dirty="0">
+                <a:solidFill>
+                  <a:schemeClr val="tx1"/>
+                </a:solidFill>
+              </a:rPr>
+              <a:t>;</a:t>
+            </a:r>
+          </a:p>
+          <a:p>
+            <a:r>
+              <a:rPr lang="en-US" sz="2000" dirty="0">
+                <a:solidFill>
+                  <a:schemeClr val="tx1"/>
+                </a:solidFill>
+              </a:rPr>
+              <a:t>}</a:t>
+            </a:r>
+          </a:p>
+          <a:p>
+            <a:r>
+              <a:rPr lang="en-US" sz="2000" dirty="0"/>
+              <a:t>else if</a:t>
+            </a:r>
+            <a:r>
+              <a:rPr lang="en-US" sz="2000" dirty="0">
+                <a:solidFill>
+                  <a:schemeClr val="tx1"/>
+                </a:solidFill>
+              </a:rPr>
+              <a:t>(mileage &gt; </a:t>
+            </a:r>
+            <a:r>
+              <a:rPr lang="en-US" sz="2000" dirty="0">
+                <a:solidFill>
+                  <a:srgbClr val="99CC00"/>
+                </a:solidFill>
+              </a:rPr>
+              <a:t>500</a:t>
+            </a:r>
+            <a:r>
+              <a:rPr lang="en-US" sz="2000" dirty="0">
+                <a:solidFill>
+                  <a:schemeClr val="tx1"/>
+                </a:solidFill>
+              </a:rPr>
+              <a:t>)</a:t>
+            </a:r>
+          </a:p>
+          <a:p>
+            <a:r>
+              <a:rPr lang="en-US" sz="2000" dirty="0">
+                <a:solidFill>
+                  <a:schemeClr val="tx1"/>
+                </a:solidFill>
+              </a:rPr>
+              <a:t>{</a:t>
+            </a:r>
+          </a:p>
+          <a:p>
+            <a:r>
+              <a:rPr lang="en-US" sz="2000" dirty="0">
+                <a:solidFill>
+                  <a:schemeClr val="tx1"/>
+                </a:solidFill>
+              </a:rPr>
+              <a:t>  fee = </a:t>
+            </a:r>
+            <a:r>
+              <a:rPr lang="en-US" sz="2000" dirty="0">
+                <a:solidFill>
+                  <a:srgbClr val="99CC00"/>
+                </a:solidFill>
+              </a:rPr>
+              <a:t>25.0M</a:t>
+            </a:r>
+            <a:r>
+              <a:rPr lang="en-US" sz="2000" dirty="0">
+                <a:solidFill>
+                  <a:schemeClr val="tx1"/>
+                </a:solidFill>
+              </a:rPr>
+              <a:t>;</a:t>
+            </a:r>
+          </a:p>
+          <a:p>
+            <a:r>
+              <a:rPr lang="en-US" sz="2000" dirty="0">
+                <a:solidFill>
+                  <a:schemeClr val="tx1"/>
+                </a:solidFill>
+              </a:rPr>
+              <a:t>}</a:t>
+            </a:r>
+          </a:p>
+        </p:txBody>
+      </p:sp>
+      <p:sp>
+        <p:nvSpPr>
+          <p:cNvPr id="6" name="TextBox 5">
+            <a:extLst>
+              <a:ext uri="{FF2B5EF4-FFF2-40B4-BE49-F238E27FC236}">
+                <a16:creationId xmlns:a16="http://schemas.microsoft.com/office/drawing/2014/main" id="{15CB3C22-3F53-4BDD-883E-1FEB5B8C6762}"/>
+              </a:ext>
+            </a:extLst>
+          </p:cNvPr>
+          <p:cNvSpPr txBox="1"/>
+          <p:nvPr/>
+        </p:nvSpPr>
+        <p:spPr>
+          <a:xfrm>
+            <a:off x="5865812" y="2820888"/>
+            <a:ext cx="3657600" cy="3477875"/>
+          </a:xfrm>
+          <a:prstGeom prst="rect">
+            <a:avLst/>
+          </a:prstGeom>
+          <a:solidFill>
+            <a:schemeClr val="bg1">
+              <a:lumMod val="85000"/>
+              <a:lumOff val="15000"/>
+            </a:schemeClr>
+          </a:solidFill>
+        </p:spPr>
+        <p:txBody>
+          <a:bodyPr wrap="square" rtlCol="0">
+            <a:spAutoFit/>
+          </a:bodyPr>
+          <a:lstStyle>
+            <a:defPPr>
+              <a:defRPr lang="en-US"/>
+            </a:defPPr>
+            <a:lvl1pPr>
+              <a:defRPr sz="2200">
+                <a:solidFill>
+                  <a:srgbClr val="0099FF"/>
+                </a:solidFill>
+                <a:latin typeface="Consolas" panose="020B0609020204030204" pitchFamily="49" charset="0"/>
+              </a:defRPr>
+            </a:lvl1pPr>
+          </a:lstStyle>
+          <a:p>
+            <a:r>
+              <a:rPr lang="en-US" sz="2000" dirty="0"/>
+              <a:t>switch</a:t>
+            </a:r>
+            <a:r>
+              <a:rPr lang="en-US" sz="2000" dirty="0">
+                <a:solidFill>
+                  <a:schemeClr val="tx1"/>
+                </a:solidFill>
+              </a:rPr>
+              <a:t>(mileage)</a:t>
+            </a:r>
+          </a:p>
+          <a:p>
+            <a:r>
+              <a:rPr lang="en-US" sz="2000" dirty="0">
+                <a:solidFill>
+                  <a:schemeClr val="tx1"/>
+                </a:solidFill>
+              </a:rPr>
+              <a:t>{</a:t>
+            </a:r>
+          </a:p>
+          <a:p>
+            <a:r>
+              <a:rPr lang="en-US" sz="2000" dirty="0">
+                <a:solidFill>
+                  <a:schemeClr val="tx1"/>
+                </a:solidFill>
+              </a:rPr>
+              <a:t>  </a:t>
+            </a:r>
+            <a:r>
+              <a:rPr lang="en-US" sz="2000" dirty="0"/>
+              <a:t>case</a:t>
+            </a:r>
+            <a:r>
+              <a:rPr lang="en-US" sz="2000" dirty="0">
+                <a:solidFill>
+                  <a:schemeClr val="tx1"/>
+                </a:solidFill>
+              </a:rPr>
+              <a:t> </a:t>
+            </a:r>
+            <a:r>
+              <a:rPr lang="en-US" sz="2000" dirty="0">
+                <a:solidFill>
+                  <a:srgbClr val="99CC00"/>
+                </a:solidFill>
+              </a:rPr>
+              <a:t>1001</a:t>
+            </a:r>
+            <a:r>
+              <a:rPr lang="en-US" sz="2000" dirty="0">
+                <a:solidFill>
+                  <a:schemeClr val="tx1"/>
+                </a:solidFill>
+              </a:rPr>
+              <a:t>:</a:t>
+            </a:r>
+          </a:p>
+          <a:p>
+            <a:r>
+              <a:rPr lang="en-US" sz="2000" dirty="0">
+                <a:solidFill>
+                  <a:schemeClr val="tx1"/>
+                </a:solidFill>
+              </a:rPr>
+              <a:t>  </a:t>
+            </a:r>
+            <a:r>
+              <a:rPr lang="en-US" sz="2000" dirty="0"/>
+              <a:t>case</a:t>
+            </a:r>
+            <a:r>
+              <a:rPr lang="en-US" sz="2000" dirty="0">
+                <a:solidFill>
+                  <a:schemeClr val="tx1"/>
+                </a:solidFill>
+              </a:rPr>
+              <a:t> </a:t>
+            </a:r>
+            <a:r>
+              <a:rPr lang="en-US" sz="2000" dirty="0">
+                <a:solidFill>
+                  <a:srgbClr val="99CC00"/>
+                </a:solidFill>
+              </a:rPr>
+              <a:t>1002</a:t>
+            </a:r>
+            <a:r>
+              <a:rPr lang="en-US" sz="2000" dirty="0">
+                <a:solidFill>
+                  <a:schemeClr val="tx1"/>
+                </a:solidFill>
+              </a:rPr>
+              <a:t>:</a:t>
+            </a:r>
+          </a:p>
+          <a:p>
+            <a:r>
+              <a:rPr lang="en-US" sz="2000" dirty="0">
+                <a:solidFill>
+                  <a:schemeClr val="tx1"/>
+                </a:solidFill>
+              </a:rPr>
+              <a:t>  </a:t>
+            </a:r>
+            <a:r>
+              <a:rPr lang="en-US" sz="2000" dirty="0"/>
+              <a:t>case</a:t>
+            </a:r>
+            <a:r>
+              <a:rPr lang="en-US" sz="2000" dirty="0">
+                <a:solidFill>
+                  <a:schemeClr val="tx1"/>
+                </a:solidFill>
+              </a:rPr>
+              <a:t> </a:t>
+            </a:r>
+            <a:r>
+              <a:rPr lang="en-US" sz="2000" dirty="0">
+                <a:solidFill>
+                  <a:srgbClr val="99CC00"/>
+                </a:solidFill>
+              </a:rPr>
+              <a:t>1003</a:t>
+            </a:r>
+            <a:r>
+              <a:rPr lang="en-US" sz="2000" dirty="0">
+                <a:solidFill>
+                  <a:schemeClr val="tx1"/>
+                </a:solidFill>
+              </a:rPr>
+              <a:t>:</a:t>
+            </a:r>
+          </a:p>
+          <a:p>
+            <a:r>
+              <a:rPr lang="en-US" sz="2000" dirty="0">
+                <a:solidFill>
+                  <a:schemeClr val="tx1"/>
+                </a:solidFill>
+              </a:rPr>
+              <a:t>  </a:t>
+            </a:r>
+            <a:r>
+              <a:rPr lang="en-US" sz="2000" dirty="0"/>
+              <a:t>case</a:t>
+            </a:r>
+            <a:r>
+              <a:rPr lang="en-US" sz="2000" dirty="0">
+                <a:solidFill>
+                  <a:schemeClr val="tx1"/>
+                </a:solidFill>
+              </a:rPr>
+              <a:t> </a:t>
+            </a:r>
+            <a:r>
+              <a:rPr lang="en-US" sz="2000" dirty="0">
+                <a:solidFill>
+                  <a:srgbClr val="99CC00"/>
+                </a:solidFill>
+              </a:rPr>
+              <a:t>1004</a:t>
+            </a:r>
+            <a:r>
+              <a:rPr lang="en-US" sz="2000" dirty="0">
+                <a:solidFill>
+                  <a:schemeClr val="tx1"/>
+                </a:solidFill>
+              </a:rPr>
+              <a:t>:</a:t>
+            </a:r>
+          </a:p>
+          <a:p>
+            <a:r>
+              <a:rPr lang="en-US" sz="2000" dirty="0">
+                <a:solidFill>
+                  <a:schemeClr val="tx1"/>
+                </a:solidFill>
+              </a:rPr>
+              <a:t>  ...</a:t>
+            </a:r>
+          </a:p>
+          <a:p>
+            <a:endParaRPr lang="en-US" sz="2000" dirty="0">
+              <a:solidFill>
+                <a:schemeClr val="tx1"/>
+              </a:solidFill>
+            </a:endParaRPr>
+          </a:p>
+          <a:p>
+            <a:r>
+              <a:rPr lang="en-US" sz="2000" dirty="0">
+                <a:solidFill>
+                  <a:schemeClr val="tx1"/>
+                </a:solidFill>
+              </a:rPr>
+              <a:t>    fee = </a:t>
+            </a:r>
+            <a:r>
+              <a:rPr lang="en-US" sz="2000" dirty="0">
+                <a:solidFill>
+                  <a:srgbClr val="99CC00"/>
+                </a:solidFill>
+              </a:rPr>
+              <a:t>50.0M</a:t>
+            </a:r>
+            <a:r>
+              <a:rPr lang="en-US" sz="2000" dirty="0">
+                <a:solidFill>
+                  <a:schemeClr val="tx1"/>
+                </a:solidFill>
+              </a:rPr>
+              <a:t>;</a:t>
+            </a:r>
+          </a:p>
+          <a:p>
+            <a:r>
+              <a:rPr lang="en-US" sz="2000" dirty="0">
+                <a:solidFill>
+                  <a:schemeClr val="tx1"/>
+                </a:solidFill>
+              </a:rPr>
+              <a:t>    </a:t>
+            </a:r>
+            <a:r>
+              <a:rPr lang="en-US" sz="2000" dirty="0"/>
+              <a:t>break</a:t>
+            </a:r>
+            <a:r>
+              <a:rPr lang="en-US" sz="2000" dirty="0">
+                <a:solidFill>
+                  <a:schemeClr val="tx1"/>
+                </a:solidFill>
+              </a:rPr>
+              <a:t>;</a:t>
+            </a:r>
+          </a:p>
+          <a:p>
+            <a:r>
+              <a:rPr lang="en-US" sz="2000" dirty="0">
+                <a:solidFill>
+                  <a:schemeClr val="tx1"/>
+                </a:solidFill>
+              </a:rPr>
+              <a:t>}</a:t>
+            </a:r>
+          </a:p>
+        </p:txBody>
+      </p:sp>
+      <p:sp>
+        <p:nvSpPr>
+          <p:cNvPr id="7" name="TextBox 6">
+            <a:extLst>
+              <a:ext uri="{FF2B5EF4-FFF2-40B4-BE49-F238E27FC236}">
+                <a16:creationId xmlns:a16="http://schemas.microsoft.com/office/drawing/2014/main" id="{2C3FCBB8-D80A-4E1A-AB5C-31CFF135317D}"/>
+              </a:ext>
+            </a:extLst>
+          </p:cNvPr>
+          <p:cNvSpPr txBox="1"/>
+          <p:nvPr/>
+        </p:nvSpPr>
+        <p:spPr>
+          <a:xfrm>
+            <a:off x="8151812" y="4267201"/>
+            <a:ext cx="3248005" cy="830997"/>
+          </a:xfrm>
+          <a:prstGeom prst="rect">
+            <a:avLst/>
+          </a:prstGeom>
+          <a:noFill/>
+        </p:spPr>
+        <p:txBody>
+          <a:bodyPr wrap="none" rtlCol="0">
+            <a:spAutoFit/>
+          </a:bodyPr>
+          <a:lstStyle/>
+          <a:p>
+            <a:r>
+              <a:rPr lang="en-US" dirty="0"/>
+              <a:t>Where would it end?</a:t>
+            </a:r>
+          </a:p>
+          <a:p>
+            <a:r>
+              <a:rPr lang="en-US" dirty="0"/>
+              <a:t>All the numbers &gt; 1000?</a:t>
+            </a:r>
+          </a:p>
+        </p:txBody>
+      </p:sp>
+      <p:cxnSp>
+        <p:nvCxnSpPr>
+          <p:cNvPr id="9" name="Straight Arrow Connector 8">
+            <a:extLst>
+              <a:ext uri="{FF2B5EF4-FFF2-40B4-BE49-F238E27FC236}">
+                <a16:creationId xmlns:a16="http://schemas.microsoft.com/office/drawing/2014/main" id="{08FDA648-459D-43F4-9073-0AFB1DBD2132}"/>
+              </a:ext>
+            </a:extLst>
+          </p:cNvPr>
+          <p:cNvCxnSpPr/>
+          <p:nvPr/>
+        </p:nvCxnSpPr>
+        <p:spPr>
+          <a:xfrm flipH="1">
+            <a:off x="7161212" y="4682699"/>
+            <a:ext cx="990600" cy="304800"/>
+          </a:xfrm>
+          <a:prstGeom prst="straightConnector1">
+            <a:avLst/>
+          </a:prstGeom>
+          <a:ln>
+            <a:tailEnd type="triangle"/>
+          </a:ln>
+        </p:spPr>
+        <p:style>
+          <a:lnRef idx="2">
+            <a:schemeClr val="accent6"/>
+          </a:lnRef>
+          <a:fillRef idx="0">
+            <a:schemeClr val="accent6"/>
+          </a:fillRef>
+          <a:effectRef idx="1">
+            <a:schemeClr val="accent6"/>
+          </a:effectRef>
+          <a:fontRef idx="minor">
+            <a:schemeClr val="tx1"/>
+          </a:fontRef>
+        </p:style>
+      </p:cxnSp>
     </p:spTree>
     <p:extLst>
       <p:ext uri="{BB962C8B-B14F-4D97-AF65-F5344CB8AC3E}">
-        <p14:creationId xmlns:p14="http://schemas.microsoft.com/office/powerpoint/2010/main" val="1726982251"/>
+        <p14:creationId xmlns:p14="http://schemas.microsoft.com/office/powerpoint/2010/main" val="2570601205"/>
       </p:ext>
     </p:extLst>
   </p:cSld>
   <p:clrMapOvr>
     <a:masterClrMapping/>
   </p:clrMapOvr>
+  <p:timing>
+    <p:tnLst>
+      <p:par>
+        <p:cTn id="1" dur="indefinite" restart="never" nodeType="tmRoot">
+          <p:childTnLst>
+            <p:seq concurrent="1" nextAc="seek">
+              <p:cTn id="2" dur="indefinite" nodeType="mainSeq">
+                <p:childTnLst>
+                  <p:par>
+                    <p:cTn id="3" fill="hold">
+                      <p:stCondLst>
+                        <p:cond delay="indefinite"/>
+                      </p:stCondLst>
+                      <p:childTnLst>
+                        <p:par>
+                          <p:cTn id="4" fill="hold">
+                            <p:stCondLst>
+                              <p:cond delay="0"/>
+                            </p:stCondLst>
+                            <p:childTnLst>
+                              <p:par>
+                                <p:cTn id="5" presetID="1" presetClass="entr" presetSubtype="0" fill="hold" grpId="0" nodeType="clickEffect">
+                                  <p:stCondLst>
+                                    <p:cond delay="0"/>
+                                  </p:stCondLst>
+                                  <p:childTnLst>
+                                    <p:set>
+                                      <p:cBhvr>
+                                        <p:cTn id="6" dur="1" fill="hold">
+                                          <p:stCondLst>
+                                            <p:cond delay="0"/>
+                                          </p:stCondLst>
+                                        </p:cTn>
+                                        <p:tgtEl>
+                                          <p:spTgt spid="6"/>
+                                        </p:tgtEl>
+                                        <p:attrNameLst>
+                                          <p:attrName>style.visibility</p:attrName>
+                                        </p:attrNameLst>
+                                      </p:cBhvr>
+                                      <p:to>
+                                        <p:strVal val="visible"/>
+                                      </p:to>
+                                    </p:set>
+                                  </p:childTnLst>
+                                </p:cTn>
+                              </p:par>
+                            </p:childTnLst>
+                          </p:cTn>
+                        </p:par>
+                      </p:childTnLst>
+                    </p:cTn>
+                  </p:par>
+                  <p:par>
+                    <p:cTn id="7" fill="hold">
+                      <p:stCondLst>
+                        <p:cond delay="indefinite"/>
+                      </p:stCondLst>
+                      <p:childTnLst>
+                        <p:par>
+                          <p:cTn id="8" fill="hold">
+                            <p:stCondLst>
+                              <p:cond delay="0"/>
+                            </p:stCondLst>
+                            <p:childTnLst>
+                              <p:par>
+                                <p:cTn id="9" presetID="1" presetClass="entr" presetSubtype="0" fill="hold" nodeType="clickEffect">
+                                  <p:stCondLst>
+                                    <p:cond delay="0"/>
+                                  </p:stCondLst>
+                                  <p:childTnLst>
+                                    <p:set>
+                                      <p:cBhvr>
+                                        <p:cTn id="10" dur="1" fill="hold">
+                                          <p:stCondLst>
+                                            <p:cond delay="0"/>
+                                          </p:stCondLst>
+                                        </p:cTn>
+                                        <p:tgtEl>
+                                          <p:spTgt spid="9"/>
+                                        </p:tgtEl>
+                                        <p:attrNameLst>
+                                          <p:attrName>style.visibility</p:attrName>
+                                        </p:attrNameLst>
+                                      </p:cBhvr>
+                                      <p:to>
+                                        <p:strVal val="visible"/>
+                                      </p:to>
+                                    </p:set>
+                                  </p:childTnLst>
+                                </p:cTn>
+                              </p:par>
+                              <p:par>
+                                <p:cTn id="11" presetID="1" presetClass="entr" presetSubtype="0" fill="hold" grpId="0" nodeType="withEffect">
+                                  <p:stCondLst>
+                                    <p:cond delay="0"/>
+                                  </p:stCondLst>
+                                  <p:childTnLst>
+                                    <p:set>
+                                      <p:cBhvr>
+                                        <p:cTn id="12" dur="1" fill="hold">
+                                          <p:stCondLst>
+                                            <p:cond delay="0"/>
+                                          </p:stCondLst>
+                                        </p:cTn>
+                                        <p:tgtEl>
+                                          <p:spTgt spid="7"/>
+                                        </p:tgtEl>
+                                        <p:attrNameLst>
+                                          <p:attrName>style.visibility</p:attrName>
+                                        </p:attrNameLst>
+                                      </p:cBhvr>
+                                      <p:to>
+                                        <p:strVal val="visible"/>
+                                      </p:to>
+                                    </p:set>
+                                  </p:childTnLst>
+                                </p:cTn>
+                              </p:par>
+                            </p:childTnLst>
+                          </p:cTn>
+                        </p:par>
+                      </p:childTnLst>
+                    </p:cTn>
+                  </p:par>
+                </p:childTnLst>
+              </p:cTn>
+              <p:prevCondLst>
+                <p:cond evt="onPrev" delay="0">
+                  <p:tgtEl>
+                    <p:sldTgt/>
+                  </p:tgtEl>
+                </p:cond>
+              </p:prevCondLst>
+              <p:nextCondLst>
+                <p:cond evt="onNext" delay="0">
+                  <p:tgtEl>
+                    <p:sldTgt/>
+                  </p:tgtEl>
+                </p:cond>
+              </p:nextCondLst>
+            </p:seq>
+          </p:childTnLst>
+        </p:cTn>
+      </p:par>
+    </p:tnLst>
+    <p:bldLst>
+      <p:bldP spid="6" grpId="0" animBg="1"/>
+      <p:bldP spid="7" grpId="0"/>
+    </p:bldLst>
+  </p:timing>
 </p:sld>
 </file>
 
@@ -4931,7 +5718,7 @@
           <p:cNvPr id="2" name="Title 1">
             <a:extLst>
               <a:ext uri="{FF2B5EF4-FFF2-40B4-BE49-F238E27FC236}">
-                <a16:creationId xmlns:a16="http://schemas.microsoft.com/office/drawing/2014/main" id="{67CB2E12-ECFA-43E7-B075-1080241E4919}"/>
+                <a16:creationId xmlns:a16="http://schemas.microsoft.com/office/drawing/2014/main" id="{42F1B814-6282-4075-A22A-DC3ABFDC9ED3}"/>
               </a:ext>
             </a:extLst>
           </p:cNvPr>
@@ -4949,7 +5736,7 @@
           <a:p>
             <a:r>
               <a:rPr lang="en-US" dirty="0"/>
-              <a:t>Assignment and If Statements</a:t>
+              <a:t>Outline</a:t>
             </a:r>
           </a:p>
         </p:txBody>
@@ -4959,7 +5746,7 @@
           <p:cNvPr id="3" name="Content Placeholder 2">
             <a:extLst>
               <a:ext uri="{FF2B5EF4-FFF2-40B4-BE49-F238E27FC236}">
-                <a16:creationId xmlns:a16="http://schemas.microsoft.com/office/drawing/2014/main" id="{5E392231-7913-4CD3-A8B7-03F7E09AB5B9}"/>
+                <a16:creationId xmlns:a16="http://schemas.microsoft.com/office/drawing/2014/main" id="{A21C63A1-E39A-4E80-92B5-E2FCBFF8D55C}"/>
               </a:ext>
             </a:extLst>
           </p:cNvPr>
@@ -4977,13 +5764,13 @@
           <a:p>
             <a:r>
               <a:rPr lang="en-US" dirty="0"/>
-              <a:t>Situation: Need to assign a variable based on result of condition</a:t>
-            </a:r>
-          </a:p>
-          <a:p>
-            <a:r>
-              <a:rPr lang="en-US" dirty="0"/>
-              <a:t>Can be done with an if statement:</a:t>
+              <a:t>Switch statements</a:t>
+            </a:r>
+          </a:p>
+          <a:p>
+            <a:r>
+              <a:rPr lang="en-US" b="1" dirty="0"/>
+              <a:t>Conditional operator</a:t>
             </a:r>
           </a:p>
         </p:txBody>
@@ -4993,7 +5780,7 @@
           <p:cNvPr id="4" name="Footer Placeholder 3">
             <a:extLst>
               <a:ext uri="{FF2B5EF4-FFF2-40B4-BE49-F238E27FC236}">
-                <a16:creationId xmlns:a16="http://schemas.microsoft.com/office/drawing/2014/main" id="{61BF4651-083E-4694-A437-6A517743271A}"/>
+                <a16:creationId xmlns:a16="http://schemas.microsoft.com/office/drawing/2014/main" id="{C185642E-D901-43E9-B9EC-3B1DBFC4E326}"/>
               </a:ext>
             </a:extLst>
           </p:cNvPr>
@@ -5016,235 +5803,10 @@
           </a:p>
         </p:txBody>
       </p:sp>
-      <p:sp>
-        <p:nvSpPr>
-          <p:cNvPr id="5" name="TextBox 4">
-            <a:extLst>
-              <a:ext uri="{FF2B5EF4-FFF2-40B4-BE49-F238E27FC236}">
-                <a16:creationId xmlns:a16="http://schemas.microsoft.com/office/drawing/2014/main" id="{A10DAEE7-9320-4374-8AC6-93E7C443C9A8}"/>
-              </a:ext>
-            </a:extLst>
-          </p:cNvPr>
-          <p:cNvSpPr txBox="1"/>
-          <p:nvPr/>
-        </p:nvSpPr>
-        <p:spPr>
-          <a:xfrm>
-            <a:off x="4494212" y="2819400"/>
-            <a:ext cx="3200400" cy="3139321"/>
-          </a:xfrm>
-          <a:prstGeom prst="rect">
-            <a:avLst/>
-          </a:prstGeom>
-          <a:solidFill>
-            <a:schemeClr val="bg1">
-              <a:lumMod val="85000"/>
-              <a:lumOff val="15000"/>
-            </a:schemeClr>
-          </a:solidFill>
-        </p:spPr>
-        <p:txBody>
-          <a:bodyPr wrap="square" rtlCol="0">
-            <a:spAutoFit/>
-          </a:bodyPr>
-          <a:lstStyle>
-            <a:defPPr>
-              <a:defRPr lang="en-US"/>
-            </a:defPPr>
-            <a:lvl1pPr>
-              <a:defRPr sz="2200">
-                <a:solidFill>
-                  <a:srgbClr val="0099FF"/>
-                </a:solidFill>
-                <a:latin typeface="Consolas" panose="020B0609020204030204" pitchFamily="49" charset="0"/>
-              </a:defRPr>
-            </a:lvl1pPr>
-          </a:lstStyle>
-          <a:p>
-            <a:r>
-              <a:rPr lang="en-US" dirty="0"/>
-              <a:t>string</a:t>
-            </a:r>
-            <a:r>
-              <a:rPr lang="en-US" dirty="0">
-                <a:solidFill>
-                  <a:schemeClr val="tx1"/>
-                </a:solidFill>
-              </a:rPr>
-              <a:t> output;</a:t>
-            </a:r>
-          </a:p>
-          <a:p>
-            <a:r>
-              <a:rPr lang="en-US" dirty="0"/>
-              <a:t>if</a:t>
-            </a:r>
-            <a:r>
-              <a:rPr lang="en-US" dirty="0">
-                <a:solidFill>
-                  <a:schemeClr val="tx1"/>
-                </a:solidFill>
-              </a:rPr>
-              <a:t>(</a:t>
-            </a:r>
-            <a:r>
-              <a:rPr lang="en-US" dirty="0" err="1">
-                <a:solidFill>
-                  <a:schemeClr val="tx1"/>
-                </a:solidFill>
-              </a:rPr>
-              <a:t>myInt</a:t>
-            </a:r>
-            <a:r>
-              <a:rPr lang="en-US" dirty="0">
-                <a:solidFill>
-                  <a:schemeClr val="tx1"/>
-                </a:solidFill>
-              </a:rPr>
-              <a:t> % </a:t>
-            </a:r>
-            <a:r>
-              <a:rPr lang="en-US" dirty="0">
-                <a:solidFill>
-                  <a:srgbClr val="99CC00"/>
-                </a:solidFill>
-              </a:rPr>
-              <a:t>2 </a:t>
-            </a:r>
-            <a:r>
-              <a:rPr lang="en-US" dirty="0">
-                <a:solidFill>
-                  <a:schemeClr val="tx1"/>
-                </a:solidFill>
-              </a:rPr>
-              <a:t>==</a:t>
-            </a:r>
-            <a:r>
-              <a:rPr lang="en-US" dirty="0">
-                <a:solidFill>
-                  <a:srgbClr val="99CC00"/>
-                </a:solidFill>
-              </a:rPr>
-              <a:t> 0</a:t>
-            </a:r>
-            <a:r>
-              <a:rPr lang="en-US" dirty="0">
-                <a:solidFill>
-                  <a:schemeClr val="tx1"/>
-                </a:solidFill>
-              </a:rPr>
-              <a:t>)</a:t>
-            </a:r>
-          </a:p>
-          <a:p>
-            <a:r>
-              <a:rPr lang="en-US" dirty="0">
-                <a:solidFill>
-                  <a:schemeClr val="tx1"/>
-                </a:solidFill>
-              </a:rPr>
-              <a:t>{</a:t>
-            </a:r>
-          </a:p>
-          <a:p>
-            <a:r>
-              <a:rPr lang="en-US" dirty="0">
-                <a:solidFill>
-                  <a:schemeClr val="tx1"/>
-                </a:solidFill>
-              </a:rPr>
-              <a:t>  output = </a:t>
-            </a:r>
-            <a:r>
-              <a:rPr lang="en-US" dirty="0">
-                <a:solidFill>
-                  <a:srgbClr val="FF5050"/>
-                </a:solidFill>
-              </a:rPr>
-              <a:t>"Even"</a:t>
-            </a:r>
-            <a:r>
-              <a:rPr lang="en-US" dirty="0">
-                <a:solidFill>
-                  <a:schemeClr val="tx1"/>
-                </a:solidFill>
-              </a:rPr>
-              <a:t>;</a:t>
-            </a:r>
-          </a:p>
-          <a:p>
-            <a:r>
-              <a:rPr lang="en-US" dirty="0">
-                <a:solidFill>
-                  <a:schemeClr val="tx1"/>
-                </a:solidFill>
-              </a:rPr>
-              <a:t>}</a:t>
-            </a:r>
-          </a:p>
-          <a:p>
-            <a:r>
-              <a:rPr lang="en-US" dirty="0"/>
-              <a:t>else</a:t>
-            </a:r>
-            <a:endParaRPr lang="en-US" dirty="0">
-              <a:solidFill>
-                <a:schemeClr val="tx1"/>
-              </a:solidFill>
-            </a:endParaRPr>
-          </a:p>
-          <a:p>
-            <a:r>
-              <a:rPr lang="en-US" dirty="0">
-                <a:solidFill>
-                  <a:schemeClr val="tx1"/>
-                </a:solidFill>
-              </a:rPr>
-              <a:t>{</a:t>
-            </a:r>
-          </a:p>
-          <a:p>
-            <a:r>
-              <a:rPr lang="en-US" dirty="0">
-                <a:solidFill>
-                  <a:schemeClr val="tx1"/>
-                </a:solidFill>
-              </a:rPr>
-              <a:t>  output = </a:t>
-            </a:r>
-            <a:r>
-              <a:rPr lang="en-US" dirty="0">
-                <a:solidFill>
-                  <a:srgbClr val="FF5050"/>
-                </a:solidFill>
-              </a:rPr>
-              <a:t>"Odd"</a:t>
-            </a:r>
-            <a:r>
-              <a:rPr lang="en-US" dirty="0">
-                <a:solidFill>
-                  <a:schemeClr val="tx1"/>
-                </a:solidFill>
-              </a:rPr>
-              <a:t>;</a:t>
-            </a:r>
-          </a:p>
-          <a:p>
-            <a:r>
-              <a:rPr lang="en-US" dirty="0">
-                <a:solidFill>
-                  <a:schemeClr val="tx1"/>
-                </a:solidFill>
-              </a:rPr>
-              <a:t>}</a:t>
-            </a:r>
-          </a:p>
-        </p:txBody>
-      </p:sp>
     </p:spTree>
     <p:extLst>
       <p:ext uri="{BB962C8B-B14F-4D97-AF65-F5344CB8AC3E}">
-        <p14:creationId xmlns:p14="http://schemas.microsoft.com/office/powerpoint/2010/main" val="3372798716"/>
+        <p14:creationId xmlns:p14="http://schemas.microsoft.com/office/powerpoint/2010/main" val="1726982251"/>
       </p:ext>
     </p:extLst>
   </p:cSld>
@@ -5276,6 +5838,351 @@
           <p:cNvPr id="2" name="Title 1">
             <a:extLst>
               <a:ext uri="{FF2B5EF4-FFF2-40B4-BE49-F238E27FC236}">
+                <a16:creationId xmlns:a16="http://schemas.microsoft.com/office/drawing/2014/main" id="{67CB2E12-ECFA-43E7-B075-1080241E4919}"/>
+              </a:ext>
+            </a:extLst>
+          </p:cNvPr>
+          <p:cNvSpPr>
+            <a:spLocks noGrp="1"/>
+          </p:cNvSpPr>
+          <p:nvPr>
+            <p:ph type="title"/>
+          </p:nvPr>
+        </p:nvSpPr>
+        <p:spPr/>
+        <p:txBody>
+          <a:bodyPr/>
+          <a:lstStyle/>
+          <a:p>
+            <a:r>
+              <a:rPr lang="en-US" dirty="0"/>
+              <a:t>Assignment and If Statements</a:t>
+            </a:r>
+          </a:p>
+        </p:txBody>
+      </p:sp>
+      <p:sp>
+        <p:nvSpPr>
+          <p:cNvPr id="3" name="Content Placeholder 2">
+            <a:extLst>
+              <a:ext uri="{FF2B5EF4-FFF2-40B4-BE49-F238E27FC236}">
+                <a16:creationId xmlns:a16="http://schemas.microsoft.com/office/drawing/2014/main" id="{5E392231-7913-4CD3-A8B7-03F7E09AB5B9}"/>
+              </a:ext>
+            </a:extLst>
+          </p:cNvPr>
+          <p:cNvSpPr>
+            <a:spLocks noGrp="1"/>
+          </p:cNvSpPr>
+          <p:nvPr>
+            <p:ph idx="1"/>
+          </p:nvPr>
+        </p:nvSpPr>
+        <p:spPr/>
+        <p:txBody>
+          <a:bodyPr/>
+          <a:lstStyle/>
+          <a:p>
+            <a:r>
+              <a:rPr lang="en-US" dirty="0"/>
+              <a:t>Situation: Need to assign a variable based on result of condition</a:t>
+            </a:r>
+          </a:p>
+          <a:p>
+            <a:r>
+              <a:rPr lang="en-US" dirty="0"/>
+              <a:t>Can be done with an if statement:</a:t>
+            </a:r>
+          </a:p>
+        </p:txBody>
+      </p:sp>
+      <p:sp>
+        <p:nvSpPr>
+          <p:cNvPr id="4" name="Footer Placeholder 3">
+            <a:extLst>
+              <a:ext uri="{FF2B5EF4-FFF2-40B4-BE49-F238E27FC236}">
+                <a16:creationId xmlns:a16="http://schemas.microsoft.com/office/drawing/2014/main" id="{61BF4651-083E-4694-A437-6A517743271A}"/>
+              </a:ext>
+            </a:extLst>
+          </p:cNvPr>
+          <p:cNvSpPr>
+            <a:spLocks noGrp="1"/>
+          </p:cNvSpPr>
+          <p:nvPr>
+            <p:ph type="ftr" sz="quarter" idx="11"/>
+          </p:nvPr>
+        </p:nvSpPr>
+        <p:spPr/>
+        <p:txBody>
+          <a:bodyPr/>
+          <a:lstStyle/>
+          <a:p>
+            <a:r>
+              <a:rPr lang="en-US"/>
+              <a:t>CSCI 1301</a:t>
+            </a:r>
+          </a:p>
+        </p:txBody>
+      </p:sp>
+      <p:sp>
+        <p:nvSpPr>
+          <p:cNvPr id="5" name="TextBox 4">
+            <a:extLst>
+              <a:ext uri="{FF2B5EF4-FFF2-40B4-BE49-F238E27FC236}">
+                <a16:creationId xmlns:a16="http://schemas.microsoft.com/office/drawing/2014/main" id="{A10DAEE7-9320-4374-8AC6-93E7C443C9A8}"/>
+              </a:ext>
+            </a:extLst>
+          </p:cNvPr>
+          <p:cNvSpPr txBox="1"/>
+          <p:nvPr/>
+        </p:nvSpPr>
+        <p:spPr>
+          <a:xfrm>
+            <a:off x="4494212" y="2819400"/>
+            <a:ext cx="3200400" cy="3139321"/>
+          </a:xfrm>
+          <a:prstGeom prst="rect">
+            <a:avLst/>
+          </a:prstGeom>
+          <a:solidFill>
+            <a:schemeClr val="bg1">
+              <a:lumMod val="85000"/>
+              <a:lumOff val="15000"/>
+            </a:schemeClr>
+          </a:solidFill>
+        </p:spPr>
+        <p:txBody>
+          <a:bodyPr wrap="square" rtlCol="0">
+            <a:spAutoFit/>
+          </a:bodyPr>
+          <a:lstStyle>
+            <a:defPPr>
+              <a:defRPr lang="en-US"/>
+            </a:defPPr>
+            <a:lvl1pPr>
+              <a:defRPr sz="2200">
+                <a:solidFill>
+                  <a:srgbClr val="0099FF"/>
+                </a:solidFill>
+                <a:latin typeface="Consolas" panose="020B0609020204030204" pitchFamily="49" charset="0"/>
+              </a:defRPr>
+            </a:lvl1pPr>
+          </a:lstStyle>
+          <a:p>
+            <a:r>
+              <a:rPr lang="en-US" dirty="0"/>
+              <a:t>string</a:t>
+            </a:r>
+            <a:r>
+              <a:rPr lang="en-US" dirty="0">
+                <a:solidFill>
+                  <a:schemeClr val="tx1"/>
+                </a:solidFill>
+              </a:rPr>
+              <a:t> output;</a:t>
+            </a:r>
+          </a:p>
+          <a:p>
+            <a:r>
+              <a:rPr lang="en-US" dirty="0"/>
+              <a:t>if</a:t>
+            </a:r>
+            <a:r>
+              <a:rPr lang="en-US" dirty="0">
+                <a:solidFill>
+                  <a:schemeClr val="tx1"/>
+                </a:solidFill>
+              </a:rPr>
+              <a:t>(</a:t>
+            </a:r>
+            <a:r>
+              <a:rPr lang="en-US" dirty="0" err="1">
+                <a:solidFill>
+                  <a:schemeClr val="tx1"/>
+                </a:solidFill>
+              </a:rPr>
+              <a:t>myInt</a:t>
+            </a:r>
+            <a:r>
+              <a:rPr lang="en-US" dirty="0">
+                <a:solidFill>
+                  <a:schemeClr val="tx1"/>
+                </a:solidFill>
+              </a:rPr>
+              <a:t> % </a:t>
+            </a:r>
+            <a:r>
+              <a:rPr lang="en-US" dirty="0">
+                <a:solidFill>
+                  <a:srgbClr val="99CC00"/>
+                </a:solidFill>
+              </a:rPr>
+              <a:t>2 </a:t>
+            </a:r>
+            <a:r>
+              <a:rPr lang="en-US" dirty="0">
+                <a:solidFill>
+                  <a:schemeClr val="tx1"/>
+                </a:solidFill>
+              </a:rPr>
+              <a:t>==</a:t>
+            </a:r>
+            <a:r>
+              <a:rPr lang="en-US" dirty="0">
+                <a:solidFill>
+                  <a:srgbClr val="99CC00"/>
+                </a:solidFill>
+              </a:rPr>
+              <a:t> 0</a:t>
+            </a:r>
+            <a:r>
+              <a:rPr lang="en-US" dirty="0">
+                <a:solidFill>
+                  <a:schemeClr val="tx1"/>
+                </a:solidFill>
+              </a:rPr>
+              <a:t>)</a:t>
+            </a:r>
+          </a:p>
+          <a:p>
+            <a:r>
+              <a:rPr lang="en-US" dirty="0">
+                <a:solidFill>
+                  <a:schemeClr val="tx1"/>
+                </a:solidFill>
+              </a:rPr>
+              <a:t>{</a:t>
+            </a:r>
+          </a:p>
+          <a:p>
+            <a:r>
+              <a:rPr lang="en-US" dirty="0">
+                <a:solidFill>
+                  <a:schemeClr val="tx1"/>
+                </a:solidFill>
+              </a:rPr>
+              <a:t>  output = </a:t>
+            </a:r>
+            <a:r>
+              <a:rPr lang="en-US" dirty="0">
+                <a:solidFill>
+                  <a:srgbClr val="FF5050"/>
+                </a:solidFill>
+              </a:rPr>
+              <a:t>"Even"</a:t>
+            </a:r>
+            <a:r>
+              <a:rPr lang="en-US" dirty="0">
+                <a:solidFill>
+                  <a:schemeClr val="tx1"/>
+                </a:solidFill>
+              </a:rPr>
+              <a:t>;</a:t>
+            </a:r>
+          </a:p>
+          <a:p>
+            <a:r>
+              <a:rPr lang="en-US" dirty="0">
+                <a:solidFill>
+                  <a:schemeClr val="tx1"/>
+                </a:solidFill>
+              </a:rPr>
+              <a:t>}</a:t>
+            </a:r>
+          </a:p>
+          <a:p>
+            <a:r>
+              <a:rPr lang="en-US" dirty="0"/>
+              <a:t>else</a:t>
+            </a:r>
+            <a:endParaRPr lang="en-US" dirty="0">
+              <a:solidFill>
+                <a:schemeClr val="tx1"/>
+              </a:solidFill>
+            </a:endParaRPr>
+          </a:p>
+          <a:p>
+            <a:r>
+              <a:rPr lang="en-US" dirty="0">
+                <a:solidFill>
+                  <a:schemeClr val="tx1"/>
+                </a:solidFill>
+              </a:rPr>
+              <a:t>{</a:t>
+            </a:r>
+          </a:p>
+          <a:p>
+            <a:r>
+              <a:rPr lang="en-US" dirty="0">
+                <a:solidFill>
+                  <a:schemeClr val="tx1"/>
+                </a:solidFill>
+              </a:rPr>
+              <a:t>  output = </a:t>
+            </a:r>
+            <a:r>
+              <a:rPr lang="en-US" dirty="0">
+                <a:solidFill>
+                  <a:srgbClr val="FF5050"/>
+                </a:solidFill>
+              </a:rPr>
+              <a:t>"Odd"</a:t>
+            </a:r>
+            <a:r>
+              <a:rPr lang="en-US" dirty="0">
+                <a:solidFill>
+                  <a:schemeClr val="tx1"/>
+                </a:solidFill>
+              </a:rPr>
+              <a:t>;</a:t>
+            </a:r>
+          </a:p>
+          <a:p>
+            <a:r>
+              <a:rPr lang="en-US" dirty="0">
+                <a:solidFill>
+                  <a:schemeClr val="tx1"/>
+                </a:solidFill>
+              </a:rPr>
+              <a:t>}</a:t>
+            </a:r>
+          </a:p>
+        </p:txBody>
+      </p:sp>
+    </p:spTree>
+    <p:extLst>
+      <p:ext uri="{BB962C8B-B14F-4D97-AF65-F5344CB8AC3E}">
+        <p14:creationId xmlns:p14="http://schemas.microsoft.com/office/powerpoint/2010/main" val="3372798716"/>
+      </p:ext>
+    </p:extLst>
+  </p:cSld>
+  <p:clrMapOvr>
+    <a:masterClrMapping/>
+  </p:clrMapOvr>
+</p:sld>
+</file>
+
+<file path=ppt/slides/slide14.xml><?xml version="1.0" encoding="utf-8"?>
+<p:sld xmlns:a="http://schemas.openxmlformats.org/drawingml/2006/main" xmlns:r="http://schemas.openxmlformats.org/officeDocument/2006/relationships" xmlns:p="http://schemas.openxmlformats.org/presentationml/2006/main">
+  <p:cSld>
+    <p:spTree>
+      <p:nvGrpSpPr>
+        <p:cNvPr id="1" name=""/>
+        <p:cNvGrpSpPr/>
+        <p:nvPr/>
+      </p:nvGrpSpPr>
+      <p:grpSpPr>
+        <a:xfrm>
+          <a:off x="0" y="0"/>
+          <a:ext cx="0" cy="0"/>
+          <a:chOff x="0" y="0"/>
+          <a:chExt cx="0" cy="0"/>
+        </a:xfrm>
+      </p:grpSpPr>
+      <p:sp>
+        <p:nvSpPr>
+          <p:cNvPr id="2" name="Title 1">
+            <a:extLst>
+              <a:ext uri="{FF2B5EF4-FFF2-40B4-BE49-F238E27FC236}">
                 <a16:creationId xmlns:a16="http://schemas.microsoft.com/office/drawing/2014/main" id="{13926525-7D41-4452-935E-FF801FB20F38}"/>
               </a:ext>
             </a:extLst>
@@ -5322,17 +6229,25 @@
           <a:p>
             <a:r>
               <a:rPr lang="en-US" dirty="0"/>
-              <a:t>Conditional operator </a:t>
-            </a:r>
-            <a:r>
-              <a:rPr lang="en-US" dirty="0">
+              <a:t>Conditional </a:t>
+            </a:r>
+            <a:r>
+              <a:rPr lang="en-US"/>
+              <a:t>operator </a:t>
+            </a:r>
+            <a:r>
+              <a:rPr lang="en-US">
                 <a:latin typeface="Consolas" panose="020B0609020204030204" pitchFamily="49" charset="0"/>
               </a:rPr>
-              <a:t>:?</a:t>
-            </a:r>
-            <a:r>
-              <a:rPr lang="en-US" dirty="0"/>
-              <a:t> is a shorter way to write it:</a:t>
+              <a:t>?:</a:t>
+            </a:r>
+            <a:r>
+              <a:rPr lang="en-US"/>
+              <a:t> </a:t>
+            </a:r>
+            <a:r>
+              <a:rPr lang="en-US" dirty="0"/>
+              <a:t>is a shorter way to write it:</a:t>
             </a:r>
           </a:p>
           <a:p>
@@ -6777,7 +7692,7 @@
 </p:sld>
 </file>
 
-<file path=ppt/slides/slide14.xml><?xml version="1.0" encoding="utf-8"?>
+<file path=ppt/slides/slide15.xml><?xml version="1.0" encoding="utf-8"?>
 <p:sld xmlns:a="http://schemas.openxmlformats.org/drawingml/2006/main" xmlns:r="http://schemas.openxmlformats.org/officeDocument/2006/relationships" xmlns:p="http://schemas.openxmlformats.org/presentationml/2006/main">
   <p:cSld>
     <p:spTree>
@@ -7415,7 +8330,7 @@
 </p:sld>
 </file>
 
-<file path=ppt/slides/slide15.xml><?xml version="1.0" encoding="utf-8"?>
+<file path=ppt/slides/slide16.xml><?xml version="1.0" encoding="utf-8"?>
 <p:sld xmlns:a="http://schemas.openxmlformats.org/drawingml/2006/main" xmlns:r="http://schemas.openxmlformats.org/officeDocument/2006/relationships" xmlns:p="http://schemas.openxmlformats.org/presentationml/2006/main">
   <p:cSld>
     <p:spTree>

</xml_diff>

<commit_message>
Fixed switch lecture's discussion of break
As Clement pointed out, C# actually doesn't allow fall-through for anything except empty case blocks. I should have double-checked this before writing my lecture.
</commit_message>
<xml_diff>
--- a/lectures/100_switch/Switch.pptx
+++ b/lectures/100_switch/Switch.pptx
@@ -5,10 +5,10 @@
     <p:sldMasterId id="2147483732" r:id="rId1"/>
   </p:sldMasterIdLst>
   <p:notesMasterIdLst>
-    <p:notesMasterId r:id="rId18"/>
+    <p:notesMasterId r:id="rId19"/>
   </p:notesMasterIdLst>
   <p:handoutMasterIdLst>
-    <p:handoutMasterId r:id="rId19"/>
+    <p:handoutMasterId r:id="rId20"/>
   </p:handoutMasterIdLst>
   <p:sldIdLst>
     <p:sldId id="256" r:id="rId2"/>
@@ -20,13 +20,14 @@
     <p:sldId id="383" r:id="rId8"/>
     <p:sldId id="382" r:id="rId9"/>
     <p:sldId id="384" r:id="rId10"/>
-    <p:sldId id="390" r:id="rId11"/>
-    <p:sldId id="391" r:id="rId12"/>
-    <p:sldId id="385" r:id="rId13"/>
-    <p:sldId id="386" r:id="rId14"/>
-    <p:sldId id="387" r:id="rId15"/>
-    <p:sldId id="388" r:id="rId16"/>
-    <p:sldId id="389" r:id="rId17"/>
+    <p:sldId id="392" r:id="rId11"/>
+    <p:sldId id="390" r:id="rId12"/>
+    <p:sldId id="391" r:id="rId13"/>
+    <p:sldId id="385" r:id="rId14"/>
+    <p:sldId id="386" r:id="rId15"/>
+    <p:sldId id="387" r:id="rId16"/>
+    <p:sldId id="388" r:id="rId17"/>
+    <p:sldId id="389" r:id="rId18"/>
   </p:sldIdLst>
   <p:sldSz cx="12188825" cy="6858000"/>
   <p:notesSz cx="6858000" cy="9144000"/>
@@ -252,7 +253,7 @@
           <a:p>
             <a:fld id="{2507D560-C4D4-4804-8CBF-2C56AB6C6DB9}" type="datetimeFigureOut">
               <a:rPr lang="en-US" smtClean="0"/>
-              <a:t>6/16/2021</a:t>
+              <a:t>7/2/2021</a:t>
             </a:fld>
             <a:endParaRPr lang="en-US"/>
           </a:p>
@@ -417,7 +418,7 @@
           <a:p>
             <a:fld id="{688E7586-9A7B-41FF-B169-85DADA744493}" type="datetimeFigureOut">
               <a:rPr lang="en-US" smtClean="0"/>
-              <a:t>6/16/2021</a:t>
+              <a:t>7/2/2021</a:t>
             </a:fld>
             <a:endParaRPr lang="en-US"/>
           </a:p>
@@ -4112,6 +4113,808 @@
           <p:cNvPr id="2" name="Title 1">
             <a:extLst>
               <a:ext uri="{FF2B5EF4-FFF2-40B4-BE49-F238E27FC236}">
+                <a16:creationId xmlns:a16="http://schemas.microsoft.com/office/drawing/2014/main" id="{42AC07DB-39F1-4B5B-BC15-090825884E9F}"/>
+              </a:ext>
+            </a:extLst>
+          </p:cNvPr>
+          <p:cNvSpPr>
+            <a:spLocks noGrp="1"/>
+          </p:cNvSpPr>
+          <p:nvPr>
+            <p:ph type="title"/>
+          </p:nvPr>
+        </p:nvSpPr>
+        <p:spPr/>
+        <p:txBody>
+          <a:bodyPr/>
+          <a:lstStyle/>
+          <a:p>
+            <a:r>
+              <a:rPr lang="en-US" dirty="0"/>
+              <a:t>Intentionally Omitting </a:t>
+            </a:r>
+            <a:r>
+              <a:rPr lang="en-US" dirty="0">
+                <a:latin typeface="Consolas" panose="020B0609020204030204" pitchFamily="49" charset="0"/>
+              </a:rPr>
+              <a:t>break</a:t>
+            </a:r>
+            <a:endParaRPr lang="en-US" dirty="0"/>
+          </a:p>
+        </p:txBody>
+      </p:sp>
+      <p:sp>
+        <p:nvSpPr>
+          <p:cNvPr id="3" name="Content Placeholder 2">
+            <a:extLst>
+              <a:ext uri="{FF2B5EF4-FFF2-40B4-BE49-F238E27FC236}">
+                <a16:creationId xmlns:a16="http://schemas.microsoft.com/office/drawing/2014/main" id="{D22ACE73-172F-4BCA-8A8B-47A680880DBC}"/>
+              </a:ext>
+            </a:extLst>
+          </p:cNvPr>
+          <p:cNvSpPr>
+            <a:spLocks noGrp="1"/>
+          </p:cNvSpPr>
+          <p:nvPr>
+            <p:ph idx="1"/>
+          </p:nvPr>
+        </p:nvSpPr>
+        <p:spPr>
+          <a:xfrm>
+            <a:off x="227013" y="1371600"/>
+            <a:ext cx="7467599" cy="4754564"/>
+          </a:xfrm>
+        </p:spPr>
+        <p:txBody>
+          <a:bodyPr/>
+          <a:lstStyle/>
+          <a:p>
+            <a:r>
+              <a:rPr lang="en-US" dirty="0"/>
+              <a:t>Multiple </a:t>
+            </a:r>
+            <a:r>
+              <a:rPr lang="en-US" dirty="0">
+                <a:latin typeface="Consolas" panose="020B0609020204030204" pitchFamily="49" charset="0"/>
+              </a:rPr>
+              <a:t>case</a:t>
+            </a:r>
+            <a:r>
+              <a:rPr lang="en-US" dirty="0"/>
+              <a:t> labels is equivalent to </a:t>
+            </a:r>
+            <a:r>
+              <a:rPr lang="en-US" dirty="0">
+                <a:latin typeface="Consolas" panose="020B0609020204030204" pitchFamily="49" charset="0"/>
+              </a:rPr>
+              <a:t>||</a:t>
+            </a:r>
+            <a:r>
+              <a:rPr lang="en-US" dirty="0"/>
+              <a:t> in an </a:t>
+            </a:r>
+            <a:r>
+              <a:rPr lang="en-US" dirty="0">
+                <a:latin typeface="Consolas" panose="020B0609020204030204" pitchFamily="49" charset="0"/>
+              </a:rPr>
+              <a:t>if</a:t>
+            </a:r>
+            <a:r>
+              <a:rPr lang="en-US" dirty="0"/>
+              <a:t> statement</a:t>
+            </a:r>
+          </a:p>
+        </p:txBody>
+      </p:sp>
+      <p:sp>
+        <p:nvSpPr>
+          <p:cNvPr id="4" name="Footer Placeholder 3">
+            <a:extLst>
+              <a:ext uri="{FF2B5EF4-FFF2-40B4-BE49-F238E27FC236}">
+                <a16:creationId xmlns:a16="http://schemas.microsoft.com/office/drawing/2014/main" id="{C2752DC8-A1B0-4B37-BF42-604720DCAF28}"/>
+              </a:ext>
+            </a:extLst>
+          </p:cNvPr>
+          <p:cNvSpPr>
+            <a:spLocks noGrp="1"/>
+          </p:cNvSpPr>
+          <p:nvPr>
+            <p:ph type="ftr" sz="quarter" idx="11"/>
+          </p:nvPr>
+        </p:nvSpPr>
+        <p:spPr/>
+        <p:txBody>
+          <a:bodyPr/>
+          <a:lstStyle/>
+          <a:p>
+            <a:r>
+              <a:rPr lang="en-US"/>
+              <a:t>CSCI 1301</a:t>
+            </a:r>
+          </a:p>
+        </p:txBody>
+      </p:sp>
+      <p:sp>
+        <p:nvSpPr>
+          <p:cNvPr id="5" name="TextBox 4">
+            <a:extLst>
+              <a:ext uri="{FF2B5EF4-FFF2-40B4-BE49-F238E27FC236}">
+                <a16:creationId xmlns:a16="http://schemas.microsoft.com/office/drawing/2014/main" id="{B357454B-53BD-46BC-B101-E4F4A7101439}"/>
+              </a:ext>
+            </a:extLst>
+          </p:cNvPr>
+          <p:cNvSpPr txBox="1"/>
+          <p:nvPr/>
+        </p:nvSpPr>
+        <p:spPr>
+          <a:xfrm>
+            <a:off x="8075612" y="1371600"/>
+            <a:ext cx="3733800" cy="4832092"/>
+          </a:xfrm>
+          <a:prstGeom prst="rect">
+            <a:avLst/>
+          </a:prstGeom>
+          <a:solidFill>
+            <a:schemeClr val="bg1">
+              <a:lumMod val="85000"/>
+              <a:lumOff val="15000"/>
+            </a:schemeClr>
+          </a:solidFill>
+        </p:spPr>
+        <p:txBody>
+          <a:bodyPr wrap="square" rtlCol="0">
+            <a:spAutoFit/>
+          </a:bodyPr>
+          <a:lstStyle>
+            <a:defPPr>
+              <a:defRPr lang="en-US"/>
+            </a:defPPr>
+            <a:lvl1pPr>
+              <a:defRPr sz="2200">
+                <a:solidFill>
+                  <a:srgbClr val="0099FF"/>
+                </a:solidFill>
+                <a:latin typeface="Consolas" panose="020B0609020204030204" pitchFamily="49" charset="0"/>
+              </a:defRPr>
+            </a:lvl1pPr>
+          </a:lstStyle>
+          <a:p>
+            <a:r>
+              <a:rPr lang="en-US" dirty="0"/>
+              <a:t>switch</a:t>
+            </a:r>
+            <a:r>
+              <a:rPr lang="en-US" dirty="0">
+                <a:solidFill>
+                  <a:schemeClr val="tx1"/>
+                </a:solidFill>
+              </a:rPr>
+              <a:t>(month)</a:t>
+            </a:r>
+          </a:p>
+          <a:p>
+            <a:r>
+              <a:rPr lang="en-US" dirty="0">
+                <a:solidFill>
+                  <a:schemeClr val="tx1"/>
+                </a:solidFill>
+              </a:rPr>
+              <a:t>{</a:t>
+            </a:r>
+          </a:p>
+          <a:p>
+            <a:r>
+              <a:rPr lang="en-US" dirty="0">
+                <a:solidFill>
+                  <a:schemeClr val="tx1"/>
+                </a:solidFill>
+              </a:rPr>
+              <a:t>  </a:t>
+            </a:r>
+            <a:r>
+              <a:rPr lang="en-US" dirty="0"/>
+              <a:t>case</a:t>
+            </a:r>
+            <a:r>
+              <a:rPr lang="en-US" dirty="0">
+                <a:solidFill>
+                  <a:schemeClr val="tx1"/>
+                </a:solidFill>
+              </a:rPr>
+              <a:t> </a:t>
+            </a:r>
+            <a:r>
+              <a:rPr lang="en-US" dirty="0">
+                <a:solidFill>
+                  <a:srgbClr val="99CC00"/>
+                </a:solidFill>
+              </a:rPr>
+              <a:t>1</a:t>
+            </a:r>
+            <a:r>
+              <a:rPr lang="en-US" dirty="0">
+                <a:solidFill>
+                  <a:schemeClr val="tx1"/>
+                </a:solidFill>
+              </a:rPr>
+              <a:t>:</a:t>
+            </a:r>
+          </a:p>
+          <a:p>
+            <a:r>
+              <a:rPr lang="en-US" dirty="0"/>
+              <a:t>  case</a:t>
+            </a:r>
+            <a:r>
+              <a:rPr lang="en-US" dirty="0">
+                <a:solidFill>
+                  <a:schemeClr val="tx1"/>
+                </a:solidFill>
+              </a:rPr>
+              <a:t> </a:t>
+            </a:r>
+            <a:r>
+              <a:rPr lang="en-US" dirty="0">
+                <a:solidFill>
+                  <a:srgbClr val="99CC00"/>
+                </a:solidFill>
+              </a:rPr>
+              <a:t>2</a:t>
+            </a:r>
+            <a:r>
+              <a:rPr lang="en-US" dirty="0">
+                <a:solidFill>
+                  <a:schemeClr val="tx1"/>
+                </a:solidFill>
+              </a:rPr>
+              <a:t>:</a:t>
+            </a:r>
+          </a:p>
+          <a:p>
+            <a:r>
+              <a:rPr lang="en-US" dirty="0"/>
+              <a:t>  case</a:t>
+            </a:r>
+            <a:r>
+              <a:rPr lang="en-US" dirty="0">
+                <a:solidFill>
+                  <a:schemeClr val="tx1"/>
+                </a:solidFill>
+              </a:rPr>
+              <a:t> </a:t>
+            </a:r>
+            <a:r>
+              <a:rPr lang="en-US" dirty="0">
+                <a:solidFill>
+                  <a:srgbClr val="99CC00"/>
+                </a:solidFill>
+              </a:rPr>
+              <a:t>3</a:t>
+            </a:r>
+            <a:r>
+              <a:rPr lang="en-US" dirty="0">
+                <a:solidFill>
+                  <a:schemeClr val="tx1"/>
+                </a:solidFill>
+              </a:rPr>
+              <a:t>:</a:t>
+            </a:r>
+          </a:p>
+          <a:p>
+            <a:r>
+              <a:rPr lang="en-US" dirty="0">
+                <a:solidFill>
+                  <a:schemeClr val="tx1"/>
+                </a:solidFill>
+              </a:rPr>
+              <a:t>    season = </a:t>
+            </a:r>
+            <a:r>
+              <a:rPr lang="en-US" dirty="0">
+                <a:solidFill>
+                  <a:srgbClr val="FF5050"/>
+                </a:solidFill>
+              </a:rPr>
+              <a:t>"Winter"</a:t>
+            </a:r>
+            <a:r>
+              <a:rPr lang="en-US" dirty="0">
+                <a:solidFill>
+                  <a:schemeClr val="tx1"/>
+                </a:solidFill>
+              </a:rPr>
+              <a:t>;</a:t>
+            </a:r>
+          </a:p>
+          <a:p>
+            <a:r>
+              <a:rPr lang="en-US" dirty="0">
+                <a:solidFill>
+                  <a:schemeClr val="tx1"/>
+                </a:solidFill>
+              </a:rPr>
+              <a:t>    </a:t>
+            </a:r>
+            <a:r>
+              <a:rPr lang="en-US" dirty="0"/>
+              <a:t>break</a:t>
+            </a:r>
+            <a:r>
+              <a:rPr lang="en-US" dirty="0">
+                <a:solidFill>
+                  <a:schemeClr val="tx1"/>
+                </a:solidFill>
+              </a:rPr>
+              <a:t>;</a:t>
+            </a:r>
+          </a:p>
+          <a:p>
+            <a:r>
+              <a:rPr lang="en-US" dirty="0"/>
+              <a:t>  case</a:t>
+            </a:r>
+            <a:r>
+              <a:rPr lang="en-US" dirty="0">
+                <a:solidFill>
+                  <a:schemeClr val="tx1"/>
+                </a:solidFill>
+              </a:rPr>
+              <a:t> </a:t>
+            </a:r>
+            <a:r>
+              <a:rPr lang="en-US" dirty="0">
+                <a:solidFill>
+                  <a:srgbClr val="99CC00"/>
+                </a:solidFill>
+              </a:rPr>
+              <a:t>4</a:t>
+            </a:r>
+            <a:r>
+              <a:rPr lang="en-US" dirty="0">
+                <a:solidFill>
+                  <a:schemeClr val="tx1"/>
+                </a:solidFill>
+              </a:rPr>
+              <a:t>:</a:t>
+            </a:r>
+          </a:p>
+          <a:p>
+            <a:r>
+              <a:rPr lang="en-US" dirty="0"/>
+              <a:t>  case</a:t>
+            </a:r>
+            <a:r>
+              <a:rPr lang="en-US" dirty="0">
+                <a:solidFill>
+                  <a:schemeClr val="tx1"/>
+                </a:solidFill>
+              </a:rPr>
+              <a:t> </a:t>
+            </a:r>
+            <a:r>
+              <a:rPr lang="en-US" dirty="0">
+                <a:solidFill>
+                  <a:srgbClr val="99CC00"/>
+                </a:solidFill>
+              </a:rPr>
+              <a:t>5</a:t>
+            </a:r>
+            <a:r>
+              <a:rPr lang="en-US" dirty="0">
+                <a:solidFill>
+                  <a:schemeClr val="tx1"/>
+                </a:solidFill>
+              </a:rPr>
+              <a:t>:</a:t>
+            </a:r>
+          </a:p>
+          <a:p>
+            <a:r>
+              <a:rPr lang="en-US" dirty="0"/>
+              <a:t>  case</a:t>
+            </a:r>
+            <a:r>
+              <a:rPr lang="en-US" dirty="0">
+                <a:solidFill>
+                  <a:schemeClr val="tx1"/>
+                </a:solidFill>
+              </a:rPr>
+              <a:t> </a:t>
+            </a:r>
+            <a:r>
+              <a:rPr lang="en-US" dirty="0">
+                <a:solidFill>
+                  <a:srgbClr val="99CC00"/>
+                </a:solidFill>
+              </a:rPr>
+              <a:t>6</a:t>
+            </a:r>
+            <a:r>
+              <a:rPr lang="en-US" dirty="0">
+                <a:solidFill>
+                  <a:schemeClr val="tx1"/>
+                </a:solidFill>
+              </a:rPr>
+              <a:t>:</a:t>
+            </a:r>
+          </a:p>
+          <a:p>
+            <a:r>
+              <a:rPr lang="en-US" dirty="0">
+                <a:solidFill>
+                  <a:schemeClr val="tx1"/>
+                </a:solidFill>
+              </a:rPr>
+              <a:t>    season = </a:t>
+            </a:r>
+            <a:r>
+              <a:rPr lang="en-US" dirty="0">
+                <a:solidFill>
+                  <a:srgbClr val="FF5050"/>
+                </a:solidFill>
+              </a:rPr>
+              <a:t>"Spring"</a:t>
+            </a:r>
+            <a:r>
+              <a:rPr lang="en-US" dirty="0">
+                <a:solidFill>
+                  <a:schemeClr val="tx1"/>
+                </a:solidFill>
+              </a:rPr>
+              <a:t>;</a:t>
+            </a:r>
+          </a:p>
+          <a:p>
+            <a:r>
+              <a:rPr lang="en-US" dirty="0">
+                <a:solidFill>
+                  <a:schemeClr val="tx1"/>
+                </a:solidFill>
+              </a:rPr>
+              <a:t>    </a:t>
+            </a:r>
+            <a:r>
+              <a:rPr lang="en-US" dirty="0"/>
+              <a:t>break</a:t>
+            </a:r>
+            <a:r>
+              <a:rPr lang="en-US" dirty="0">
+                <a:solidFill>
+                  <a:schemeClr val="tx1"/>
+                </a:solidFill>
+              </a:rPr>
+              <a:t>;</a:t>
+            </a:r>
+          </a:p>
+          <a:p>
+            <a:r>
+              <a:rPr lang="en-US" dirty="0">
+                <a:solidFill>
+                  <a:schemeClr val="tx1"/>
+                </a:solidFill>
+              </a:rPr>
+              <a:t>...</a:t>
+            </a:r>
+          </a:p>
+          <a:p>
+            <a:r>
+              <a:rPr lang="en-US" dirty="0">
+                <a:solidFill>
+                  <a:schemeClr val="tx1"/>
+                </a:solidFill>
+              </a:rPr>
+              <a:t>}</a:t>
+            </a:r>
+          </a:p>
+        </p:txBody>
+      </p:sp>
+      <p:sp>
+        <p:nvSpPr>
+          <p:cNvPr id="6" name="TextBox 5">
+            <a:extLst>
+              <a:ext uri="{FF2B5EF4-FFF2-40B4-BE49-F238E27FC236}">
+                <a16:creationId xmlns:a16="http://schemas.microsoft.com/office/drawing/2014/main" id="{B082FFC4-CDBA-4625-8937-3DA65A3CCD3F}"/>
+              </a:ext>
+            </a:extLst>
+          </p:cNvPr>
+          <p:cNvSpPr txBox="1"/>
+          <p:nvPr/>
+        </p:nvSpPr>
+        <p:spPr>
+          <a:xfrm>
+            <a:off x="252195" y="2743200"/>
+            <a:ext cx="7442417" cy="3139321"/>
+          </a:xfrm>
+          <a:prstGeom prst="rect">
+            <a:avLst/>
+          </a:prstGeom>
+          <a:solidFill>
+            <a:schemeClr val="bg1">
+              <a:lumMod val="85000"/>
+              <a:lumOff val="15000"/>
+            </a:schemeClr>
+          </a:solidFill>
+        </p:spPr>
+        <p:txBody>
+          <a:bodyPr wrap="square" rtlCol="0">
+            <a:spAutoFit/>
+          </a:bodyPr>
+          <a:lstStyle>
+            <a:defPPr>
+              <a:defRPr lang="en-US"/>
+            </a:defPPr>
+            <a:lvl1pPr>
+              <a:defRPr sz="2200">
+                <a:solidFill>
+                  <a:srgbClr val="0099FF"/>
+                </a:solidFill>
+                <a:latin typeface="Consolas" panose="020B0609020204030204" pitchFamily="49" charset="0"/>
+              </a:defRPr>
+            </a:lvl1pPr>
+          </a:lstStyle>
+          <a:p>
+            <a:r>
+              <a:rPr lang="en-US" dirty="0"/>
+              <a:t>if</a:t>
+            </a:r>
+            <a:r>
+              <a:rPr lang="en-US" dirty="0">
+                <a:solidFill>
+                  <a:schemeClr val="tx1"/>
+                </a:solidFill>
+              </a:rPr>
+              <a:t>(month == </a:t>
+            </a:r>
+            <a:r>
+              <a:rPr lang="en-US" dirty="0">
+                <a:solidFill>
+                  <a:srgbClr val="99CC00"/>
+                </a:solidFill>
+              </a:rPr>
+              <a:t>1</a:t>
+            </a:r>
+            <a:r>
+              <a:rPr lang="en-US" dirty="0">
+                <a:solidFill>
+                  <a:schemeClr val="tx1"/>
+                </a:solidFill>
+              </a:rPr>
+              <a:t> || month == </a:t>
+            </a:r>
+            <a:r>
+              <a:rPr lang="en-US" dirty="0">
+                <a:solidFill>
+                  <a:srgbClr val="99CC00"/>
+                </a:solidFill>
+              </a:rPr>
+              <a:t>2 </a:t>
+            </a:r>
+            <a:r>
+              <a:rPr lang="en-US" dirty="0">
+                <a:solidFill>
+                  <a:schemeClr val="tx1"/>
+                </a:solidFill>
+              </a:rPr>
+              <a:t>|| month == </a:t>
+            </a:r>
+            <a:r>
+              <a:rPr lang="en-US" dirty="0">
+                <a:solidFill>
+                  <a:srgbClr val="99CC00"/>
+                </a:solidFill>
+              </a:rPr>
+              <a:t>3</a:t>
+            </a:r>
+            <a:r>
+              <a:rPr lang="en-US" dirty="0">
+                <a:solidFill>
+                  <a:schemeClr val="tx1"/>
+                </a:solidFill>
+              </a:rPr>
+              <a:t>)</a:t>
+            </a:r>
+          </a:p>
+          <a:p>
+            <a:r>
+              <a:rPr lang="en-US" dirty="0">
+                <a:solidFill>
+                  <a:schemeClr val="tx1"/>
+                </a:solidFill>
+              </a:rPr>
+              <a:t>{</a:t>
+            </a:r>
+          </a:p>
+          <a:p>
+            <a:r>
+              <a:rPr lang="en-US" dirty="0">
+                <a:solidFill>
+                  <a:schemeClr val="tx1"/>
+                </a:solidFill>
+              </a:rPr>
+              <a:t>  season = </a:t>
+            </a:r>
+            <a:r>
+              <a:rPr lang="en-US" dirty="0">
+                <a:solidFill>
+                  <a:srgbClr val="FF5050"/>
+                </a:solidFill>
+              </a:rPr>
+              <a:t>"Winter"</a:t>
+            </a:r>
+            <a:r>
+              <a:rPr lang="en-US" dirty="0">
+                <a:solidFill>
+                  <a:schemeClr val="tx1"/>
+                </a:solidFill>
+              </a:rPr>
+              <a:t>;</a:t>
+            </a:r>
+          </a:p>
+          <a:p>
+            <a:r>
+              <a:rPr lang="en-US" dirty="0">
+                <a:solidFill>
+                  <a:schemeClr val="tx1"/>
+                </a:solidFill>
+              </a:rPr>
+              <a:t>}</a:t>
+            </a:r>
+          </a:p>
+          <a:p>
+            <a:r>
+              <a:rPr lang="en-US" dirty="0"/>
+              <a:t>else if</a:t>
+            </a:r>
+            <a:r>
+              <a:rPr lang="en-US" dirty="0">
+                <a:solidFill>
+                  <a:schemeClr val="tx1"/>
+                </a:solidFill>
+              </a:rPr>
+              <a:t>(month == </a:t>
+            </a:r>
+            <a:r>
+              <a:rPr lang="en-US" dirty="0">
+                <a:solidFill>
+                  <a:srgbClr val="99CC00"/>
+                </a:solidFill>
+              </a:rPr>
+              <a:t>4</a:t>
+            </a:r>
+            <a:r>
+              <a:rPr lang="en-US" dirty="0">
+                <a:solidFill>
+                  <a:schemeClr val="tx1"/>
+                </a:solidFill>
+              </a:rPr>
+              <a:t> || month == </a:t>
+            </a:r>
+            <a:r>
+              <a:rPr lang="en-US" dirty="0">
+                <a:solidFill>
+                  <a:srgbClr val="99CC00"/>
+                </a:solidFill>
+              </a:rPr>
+              <a:t>5</a:t>
+            </a:r>
+            <a:r>
+              <a:rPr lang="en-US" dirty="0">
+                <a:solidFill>
+                  <a:schemeClr val="tx1"/>
+                </a:solidFill>
+              </a:rPr>
+              <a:t> || month == </a:t>
+            </a:r>
+            <a:r>
+              <a:rPr lang="en-US" dirty="0">
+                <a:solidFill>
+                  <a:srgbClr val="99CC00"/>
+                </a:solidFill>
+              </a:rPr>
+              <a:t>6</a:t>
+            </a:r>
+            <a:r>
+              <a:rPr lang="en-US" dirty="0">
+                <a:solidFill>
+                  <a:schemeClr val="tx1"/>
+                </a:solidFill>
+              </a:rPr>
+              <a:t>)</a:t>
+            </a:r>
+          </a:p>
+          <a:p>
+            <a:r>
+              <a:rPr lang="en-US" dirty="0">
+                <a:solidFill>
+                  <a:schemeClr val="tx1"/>
+                </a:solidFill>
+              </a:rPr>
+              <a:t>{</a:t>
+            </a:r>
+          </a:p>
+          <a:p>
+            <a:r>
+              <a:rPr lang="en-US" dirty="0">
+                <a:solidFill>
+                  <a:schemeClr val="tx1"/>
+                </a:solidFill>
+              </a:rPr>
+              <a:t>  season = </a:t>
+            </a:r>
+            <a:r>
+              <a:rPr lang="en-US" dirty="0">
+                <a:solidFill>
+                  <a:srgbClr val="FF5050"/>
+                </a:solidFill>
+              </a:rPr>
+              <a:t>"Spring"</a:t>
+            </a:r>
+            <a:r>
+              <a:rPr lang="en-US" dirty="0">
+                <a:solidFill>
+                  <a:schemeClr val="tx1"/>
+                </a:solidFill>
+              </a:rPr>
+              <a:t>;</a:t>
+            </a:r>
+          </a:p>
+          <a:p>
+            <a:r>
+              <a:rPr lang="en-US" dirty="0">
+                <a:solidFill>
+                  <a:schemeClr val="tx1"/>
+                </a:solidFill>
+              </a:rPr>
+              <a:t>}</a:t>
+            </a:r>
+          </a:p>
+          <a:p>
+            <a:r>
+              <a:rPr lang="en-US" dirty="0">
+                <a:solidFill>
+                  <a:schemeClr val="tx1"/>
+                </a:solidFill>
+              </a:rPr>
+              <a:t>...</a:t>
+            </a:r>
+          </a:p>
+        </p:txBody>
+      </p:sp>
+    </p:spTree>
+    <p:extLst>
+      <p:ext uri="{BB962C8B-B14F-4D97-AF65-F5344CB8AC3E}">
+        <p14:creationId xmlns:p14="http://schemas.microsoft.com/office/powerpoint/2010/main" val="3326351923"/>
+      </p:ext>
+    </p:extLst>
+  </p:cSld>
+  <p:clrMapOvr>
+    <a:masterClrMapping/>
+  </p:clrMapOvr>
+</p:sld>
+</file>
+
+<file path=ppt/slides/slide11.xml><?xml version="1.0" encoding="utf-8"?>
+<p:sld xmlns:a="http://schemas.openxmlformats.org/drawingml/2006/main" xmlns:r="http://schemas.openxmlformats.org/officeDocument/2006/relationships" xmlns:p="http://schemas.openxmlformats.org/presentationml/2006/main">
+  <p:cSld>
+    <p:spTree>
+      <p:nvGrpSpPr>
+        <p:cNvPr id="1" name=""/>
+        <p:cNvGrpSpPr/>
+        <p:nvPr/>
+      </p:nvGrpSpPr>
+      <p:grpSpPr>
+        <a:xfrm>
+          <a:off x="0" y="0"/>
+          <a:ext cx="0" cy="0"/>
+          <a:chOff x="0" y="0"/>
+          <a:chExt cx="0" cy="0"/>
+        </a:xfrm>
+      </p:grpSpPr>
+      <p:sp>
+        <p:nvSpPr>
+          <p:cNvPr id="2" name="Title 1">
+            <a:extLst>
+              <a:ext uri="{FF2B5EF4-FFF2-40B4-BE49-F238E27FC236}">
                 <a16:creationId xmlns:a16="http://schemas.microsoft.com/office/drawing/2014/main" id="{0A3BE7EE-1813-430D-B261-41B415655251}"/>
               </a:ext>
             </a:extLst>
@@ -4790,7 +5593,7 @@
 </p:sld>
 </file>
 
-<file path=ppt/slides/slide11.xml><?xml version="1.0" encoding="utf-8"?>
+<file path=ppt/slides/slide12.xml><?xml version="1.0" encoding="utf-8"?>
 <p:sld xmlns:a="http://schemas.openxmlformats.org/drawingml/2006/main" xmlns:r="http://schemas.openxmlformats.org/officeDocument/2006/relationships" xmlns:p="http://schemas.openxmlformats.org/presentationml/2006/main">
   <p:cSld>
     <p:spTree>
@@ -5696,126 +6499,6 @@
 </p:sld>
 </file>
 
-<file path=ppt/slides/slide12.xml><?xml version="1.0" encoding="utf-8"?>
-<p:sld xmlns:a="http://schemas.openxmlformats.org/drawingml/2006/main" xmlns:r="http://schemas.openxmlformats.org/officeDocument/2006/relationships" xmlns:p="http://schemas.openxmlformats.org/presentationml/2006/main">
-  <p:cSld>
-    <p:spTree>
-      <p:nvGrpSpPr>
-        <p:cNvPr id="1" name=""/>
-        <p:cNvGrpSpPr/>
-        <p:nvPr/>
-      </p:nvGrpSpPr>
-      <p:grpSpPr>
-        <a:xfrm>
-          <a:off x="0" y="0"/>
-          <a:ext cx="0" cy="0"/>
-          <a:chOff x="0" y="0"/>
-          <a:chExt cx="0" cy="0"/>
-        </a:xfrm>
-      </p:grpSpPr>
-      <p:sp>
-        <p:nvSpPr>
-          <p:cNvPr id="2" name="Title 1">
-            <a:extLst>
-              <a:ext uri="{FF2B5EF4-FFF2-40B4-BE49-F238E27FC236}">
-                <a16:creationId xmlns:a16="http://schemas.microsoft.com/office/drawing/2014/main" id="{42F1B814-6282-4075-A22A-DC3ABFDC9ED3}"/>
-              </a:ext>
-            </a:extLst>
-          </p:cNvPr>
-          <p:cNvSpPr>
-            <a:spLocks noGrp="1"/>
-          </p:cNvSpPr>
-          <p:nvPr>
-            <p:ph type="title"/>
-          </p:nvPr>
-        </p:nvSpPr>
-        <p:spPr/>
-        <p:txBody>
-          <a:bodyPr/>
-          <a:lstStyle/>
-          <a:p>
-            <a:r>
-              <a:rPr lang="en-US" dirty="0"/>
-              <a:t>Outline</a:t>
-            </a:r>
-          </a:p>
-        </p:txBody>
-      </p:sp>
-      <p:sp>
-        <p:nvSpPr>
-          <p:cNvPr id="3" name="Content Placeholder 2">
-            <a:extLst>
-              <a:ext uri="{FF2B5EF4-FFF2-40B4-BE49-F238E27FC236}">
-                <a16:creationId xmlns:a16="http://schemas.microsoft.com/office/drawing/2014/main" id="{A21C63A1-E39A-4E80-92B5-E2FCBFF8D55C}"/>
-              </a:ext>
-            </a:extLst>
-          </p:cNvPr>
-          <p:cNvSpPr>
-            <a:spLocks noGrp="1"/>
-          </p:cNvSpPr>
-          <p:nvPr>
-            <p:ph idx="1"/>
-          </p:nvPr>
-        </p:nvSpPr>
-        <p:spPr/>
-        <p:txBody>
-          <a:bodyPr/>
-          <a:lstStyle/>
-          <a:p>
-            <a:r>
-              <a:rPr lang="en-US" dirty="0"/>
-              <a:t>Switch statements</a:t>
-            </a:r>
-          </a:p>
-          <a:p>
-            <a:r>
-              <a:rPr lang="en-US" b="1" dirty="0"/>
-              <a:t>Conditional operator</a:t>
-            </a:r>
-          </a:p>
-        </p:txBody>
-      </p:sp>
-      <p:sp>
-        <p:nvSpPr>
-          <p:cNvPr id="4" name="Footer Placeholder 3">
-            <a:extLst>
-              <a:ext uri="{FF2B5EF4-FFF2-40B4-BE49-F238E27FC236}">
-                <a16:creationId xmlns:a16="http://schemas.microsoft.com/office/drawing/2014/main" id="{C185642E-D901-43E9-B9EC-3B1DBFC4E326}"/>
-              </a:ext>
-            </a:extLst>
-          </p:cNvPr>
-          <p:cNvSpPr>
-            <a:spLocks noGrp="1"/>
-          </p:cNvSpPr>
-          <p:nvPr>
-            <p:ph type="ftr" sz="quarter" idx="11"/>
-          </p:nvPr>
-        </p:nvSpPr>
-        <p:spPr/>
-        <p:txBody>
-          <a:bodyPr/>
-          <a:lstStyle/>
-          <a:p>
-            <a:r>
-              <a:rPr lang="en-US"/>
-              <a:t>CSCI 1301</a:t>
-            </a:r>
-          </a:p>
-        </p:txBody>
-      </p:sp>
-    </p:spTree>
-    <p:extLst>
-      <p:ext uri="{BB962C8B-B14F-4D97-AF65-F5344CB8AC3E}">
-        <p14:creationId xmlns:p14="http://schemas.microsoft.com/office/powerpoint/2010/main" val="1726982251"/>
-      </p:ext>
-    </p:extLst>
-  </p:cSld>
-  <p:clrMapOvr>
-    <a:masterClrMapping/>
-  </p:clrMapOvr>
-</p:sld>
-</file>
-
 <file path=ppt/slides/slide13.xml><?xml version="1.0" encoding="utf-8"?>
 <p:sld xmlns:a="http://schemas.openxmlformats.org/drawingml/2006/main" xmlns:r="http://schemas.openxmlformats.org/officeDocument/2006/relationships" xmlns:p="http://schemas.openxmlformats.org/presentationml/2006/main">
   <p:cSld>
@@ -5838,6 +6521,126 @@
           <p:cNvPr id="2" name="Title 1">
             <a:extLst>
               <a:ext uri="{FF2B5EF4-FFF2-40B4-BE49-F238E27FC236}">
+                <a16:creationId xmlns:a16="http://schemas.microsoft.com/office/drawing/2014/main" id="{42F1B814-6282-4075-A22A-DC3ABFDC9ED3}"/>
+              </a:ext>
+            </a:extLst>
+          </p:cNvPr>
+          <p:cNvSpPr>
+            <a:spLocks noGrp="1"/>
+          </p:cNvSpPr>
+          <p:nvPr>
+            <p:ph type="title"/>
+          </p:nvPr>
+        </p:nvSpPr>
+        <p:spPr/>
+        <p:txBody>
+          <a:bodyPr/>
+          <a:lstStyle/>
+          <a:p>
+            <a:r>
+              <a:rPr lang="en-US" dirty="0"/>
+              <a:t>Outline</a:t>
+            </a:r>
+          </a:p>
+        </p:txBody>
+      </p:sp>
+      <p:sp>
+        <p:nvSpPr>
+          <p:cNvPr id="3" name="Content Placeholder 2">
+            <a:extLst>
+              <a:ext uri="{FF2B5EF4-FFF2-40B4-BE49-F238E27FC236}">
+                <a16:creationId xmlns:a16="http://schemas.microsoft.com/office/drawing/2014/main" id="{A21C63A1-E39A-4E80-92B5-E2FCBFF8D55C}"/>
+              </a:ext>
+            </a:extLst>
+          </p:cNvPr>
+          <p:cNvSpPr>
+            <a:spLocks noGrp="1"/>
+          </p:cNvSpPr>
+          <p:nvPr>
+            <p:ph idx="1"/>
+          </p:nvPr>
+        </p:nvSpPr>
+        <p:spPr/>
+        <p:txBody>
+          <a:bodyPr/>
+          <a:lstStyle/>
+          <a:p>
+            <a:r>
+              <a:rPr lang="en-US" dirty="0"/>
+              <a:t>Switch statements</a:t>
+            </a:r>
+          </a:p>
+          <a:p>
+            <a:r>
+              <a:rPr lang="en-US" b="1" dirty="0"/>
+              <a:t>Conditional operator</a:t>
+            </a:r>
+          </a:p>
+        </p:txBody>
+      </p:sp>
+      <p:sp>
+        <p:nvSpPr>
+          <p:cNvPr id="4" name="Footer Placeholder 3">
+            <a:extLst>
+              <a:ext uri="{FF2B5EF4-FFF2-40B4-BE49-F238E27FC236}">
+                <a16:creationId xmlns:a16="http://schemas.microsoft.com/office/drawing/2014/main" id="{C185642E-D901-43E9-B9EC-3B1DBFC4E326}"/>
+              </a:ext>
+            </a:extLst>
+          </p:cNvPr>
+          <p:cNvSpPr>
+            <a:spLocks noGrp="1"/>
+          </p:cNvSpPr>
+          <p:nvPr>
+            <p:ph type="ftr" sz="quarter" idx="11"/>
+          </p:nvPr>
+        </p:nvSpPr>
+        <p:spPr/>
+        <p:txBody>
+          <a:bodyPr/>
+          <a:lstStyle/>
+          <a:p>
+            <a:r>
+              <a:rPr lang="en-US"/>
+              <a:t>CSCI 1301</a:t>
+            </a:r>
+          </a:p>
+        </p:txBody>
+      </p:sp>
+    </p:spTree>
+    <p:extLst>
+      <p:ext uri="{BB962C8B-B14F-4D97-AF65-F5344CB8AC3E}">
+        <p14:creationId xmlns:p14="http://schemas.microsoft.com/office/powerpoint/2010/main" val="1726982251"/>
+      </p:ext>
+    </p:extLst>
+  </p:cSld>
+  <p:clrMapOvr>
+    <a:masterClrMapping/>
+  </p:clrMapOvr>
+</p:sld>
+</file>
+
+<file path=ppt/slides/slide14.xml><?xml version="1.0" encoding="utf-8"?>
+<p:sld xmlns:a="http://schemas.openxmlformats.org/drawingml/2006/main" xmlns:r="http://schemas.openxmlformats.org/officeDocument/2006/relationships" xmlns:p="http://schemas.openxmlformats.org/presentationml/2006/main">
+  <p:cSld>
+    <p:spTree>
+      <p:nvGrpSpPr>
+        <p:cNvPr id="1" name=""/>
+        <p:cNvGrpSpPr/>
+        <p:nvPr/>
+      </p:nvGrpSpPr>
+      <p:grpSpPr>
+        <a:xfrm>
+          <a:off x="0" y="0"/>
+          <a:ext cx="0" cy="0"/>
+          <a:chOff x="0" y="0"/>
+          <a:chExt cx="0" cy="0"/>
+        </a:xfrm>
+      </p:grpSpPr>
+      <p:sp>
+        <p:nvSpPr>
+          <p:cNvPr id="2" name="Title 1">
+            <a:extLst>
+              <a:ext uri="{FF2B5EF4-FFF2-40B4-BE49-F238E27FC236}">
                 <a16:creationId xmlns:a16="http://schemas.microsoft.com/office/drawing/2014/main" id="{67CB2E12-ECFA-43E7-B075-1080241E4919}"/>
               </a:ext>
             </a:extLst>
@@ -6161,7 +6964,7 @@
 </p:sld>
 </file>
 
-<file path=ppt/slides/slide14.xml><?xml version="1.0" encoding="utf-8"?>
+<file path=ppt/slides/slide15.xml><?xml version="1.0" encoding="utf-8"?>
 <p:sld xmlns:a="http://schemas.openxmlformats.org/drawingml/2006/main" xmlns:r="http://schemas.openxmlformats.org/officeDocument/2006/relationships" xmlns:p="http://schemas.openxmlformats.org/presentationml/2006/main">
   <p:cSld>
     <p:spTree>
@@ -7692,7 +8495,7 @@
 </p:sld>
 </file>
 
-<file path=ppt/slides/slide15.xml><?xml version="1.0" encoding="utf-8"?>
+<file path=ppt/slides/slide16.xml><?xml version="1.0" encoding="utf-8"?>
 <p:sld xmlns:a="http://schemas.openxmlformats.org/drawingml/2006/main" xmlns:r="http://schemas.openxmlformats.org/officeDocument/2006/relationships" xmlns:p="http://schemas.openxmlformats.org/presentationml/2006/main">
   <p:cSld>
     <p:spTree>
@@ -8330,7 +9133,7 @@
 </p:sld>
 </file>
 
-<file path=ppt/slides/slide16.xml><?xml version="1.0" encoding="utf-8"?>
+<file path=ppt/slides/slide17.xml><?xml version="1.0" encoding="utf-8"?>
 <p:sld xmlns:a="http://schemas.openxmlformats.org/drawingml/2006/main" xmlns:r="http://schemas.openxmlformats.org/officeDocument/2006/relationships" xmlns:p="http://schemas.openxmlformats.org/presentationml/2006/main">
   <p:cSld>
     <p:spTree>
@@ -12313,73 +13116,18 @@
           <a:lstStyle/>
           <a:p>
             <a:r>
-              <a:rPr lang="en-US" dirty="0"/>
-              <a:t>The Importance of </a:t>
-            </a:r>
-            <a:r>
               <a:rPr lang="en-US" dirty="0">
                 <a:latin typeface="Consolas" panose="020B0609020204030204" pitchFamily="49" charset="0"/>
               </a:rPr>
               <a:t>break</a:t>
             </a:r>
-          </a:p>
-        </p:txBody>
-      </p:sp>
-      <p:sp>
-        <p:nvSpPr>
-          <p:cNvPr id="3" name="Content Placeholder 2">
-            <a:extLst>
-              <a:ext uri="{FF2B5EF4-FFF2-40B4-BE49-F238E27FC236}">
-                <a16:creationId xmlns:a16="http://schemas.microsoft.com/office/drawing/2014/main" id="{58AD2A14-BAC1-4323-9DE7-3EAA32D0B8F6}"/>
-              </a:ext>
-            </a:extLst>
-          </p:cNvPr>
-          <p:cNvSpPr>
-            <a:spLocks noGrp="1"/>
-          </p:cNvSpPr>
-          <p:nvPr>
-            <p:ph idx="1"/>
-          </p:nvPr>
-        </p:nvSpPr>
-        <p:spPr/>
-        <p:txBody>
-          <a:bodyPr/>
-          <a:lstStyle/>
-          <a:p>
-            <a:r>
-              <a:rPr lang="en-US" dirty="0">
-                <a:latin typeface="Consolas" panose="020B0609020204030204" pitchFamily="49" charset="0"/>
-              </a:rPr>
-              <a:t>case</a:t>
-            </a:r>
-            <a:r>
-              <a:rPr lang="en-US" dirty="0"/>
-              <a:t> statements define where code execution </a:t>
-            </a:r>
-            <a:r>
-              <a:rPr lang="en-US" b="1" dirty="0"/>
-              <a:t>starts</a:t>
-            </a:r>
-            <a:r>
-              <a:rPr lang="en-US" dirty="0"/>
-              <a:t>, not ends</a:t>
-            </a:r>
-          </a:p>
-          <a:p>
-            <a:r>
-              <a:rPr lang="en-US" dirty="0"/>
-              <a:t>If your case “block” does not end with </a:t>
-            </a:r>
-            <a:r>
-              <a:rPr lang="en-US" dirty="0">
-                <a:latin typeface="Consolas" panose="020B0609020204030204" pitchFamily="49" charset="0"/>
-              </a:rPr>
-              <a:t>break</a:t>
-            </a:r>
-            <a:r>
-              <a:rPr lang="en-US" dirty="0"/>
-              <a:t>, execution will continue to the next line (AKA “fall-through”)</a:t>
-            </a:r>
+            <a:r>
+              <a:rPr lang="en-US" dirty="0"/>
+              <a:t> is (Usually) Required</a:t>
+            </a:r>
+            <a:endParaRPr lang="en-US" dirty="0">
+              <a:latin typeface="Consolas" panose="020B0609020204030204" pitchFamily="49" charset="0"/>
+            </a:endParaRPr>
           </a:p>
         </p:txBody>
       </p:sp>
@@ -12413,10 +13161,84 @@
       </p:sp>
       <p:sp>
         <p:nvSpPr>
-          <p:cNvPr id="5" name="TextBox 4">
+          <p:cNvPr id="11" name="Content Placeholder 10">
             <a:extLst>
               <a:ext uri="{FF2B5EF4-FFF2-40B4-BE49-F238E27FC236}">
-                <a16:creationId xmlns:a16="http://schemas.microsoft.com/office/drawing/2014/main" id="{9259F6EC-F829-4EA4-91DF-2E0C08858073}"/>
+                <a16:creationId xmlns:a16="http://schemas.microsoft.com/office/drawing/2014/main" id="{B75B2A9E-9574-4E18-A9F4-7EF373847056}"/>
+              </a:ext>
+            </a:extLst>
+          </p:cNvPr>
+          <p:cNvSpPr>
+            <a:spLocks noGrp="1"/>
+          </p:cNvSpPr>
+          <p:nvPr>
+            <p:ph sz="quarter" idx="13"/>
+          </p:nvPr>
+        </p:nvSpPr>
+        <p:spPr/>
+        <p:txBody>
+          <a:bodyPr/>
+          <a:lstStyle/>
+          <a:p>
+            <a:r>
+              <a:rPr lang="en-US" dirty="0">
+                <a:latin typeface="Consolas" panose="020B0609020204030204" pitchFamily="49" charset="0"/>
+              </a:rPr>
+              <a:t>case</a:t>
+            </a:r>
+            <a:r>
+              <a:rPr lang="en-US" dirty="0"/>
+              <a:t> statements define where code execution </a:t>
+            </a:r>
+            <a:r>
+              <a:rPr lang="en-US" b="1" dirty="0"/>
+              <a:t>starts</a:t>
+            </a:r>
+            <a:r>
+              <a:rPr lang="en-US" dirty="0"/>
+              <a:t>, not ends</a:t>
+            </a:r>
+          </a:p>
+          <a:p>
+            <a:r>
+              <a:rPr lang="en-US" dirty="0"/>
+              <a:t>Omitting </a:t>
+            </a:r>
+            <a:r>
+              <a:rPr lang="en-US" dirty="0">
+                <a:latin typeface="Consolas" panose="020B0609020204030204" pitchFamily="49" charset="0"/>
+              </a:rPr>
+              <a:t>break</a:t>
+            </a:r>
+            <a:r>
+              <a:rPr lang="en-US" dirty="0"/>
+              <a:t> at the end of a </a:t>
+            </a:r>
+            <a:r>
+              <a:rPr lang="en-US" dirty="0">
+                <a:latin typeface="Consolas" panose="020B0609020204030204" pitchFamily="49" charset="0"/>
+              </a:rPr>
+              <a:t>case</a:t>
+            </a:r>
+            <a:r>
+              <a:rPr lang="en-US" dirty="0"/>
+              <a:t> is an error, like omitting a </a:t>
+            </a:r>
+            <a:r>
+              <a:rPr lang="en-US" dirty="0">
+                <a:latin typeface="Consolas" panose="020B0609020204030204" pitchFamily="49" charset="0"/>
+              </a:rPr>
+              <a:t>}</a:t>
+            </a:r>
+          </a:p>
+        </p:txBody>
+      </p:sp>
+      <p:sp>
+        <p:nvSpPr>
+          <p:cNvPr id="16" name="TextBox 15">
+            <a:extLst>
+              <a:ext uri="{FF2B5EF4-FFF2-40B4-BE49-F238E27FC236}">
+                <a16:creationId xmlns:a16="http://schemas.microsoft.com/office/drawing/2014/main" id="{C165C2F2-8DED-42BD-98C2-244F3329237B}"/>
               </a:ext>
             </a:extLst>
           </p:cNvPr>
@@ -12425,8 +13247,8 @@
         </p:nvSpPr>
         <p:spPr>
           <a:xfrm>
-            <a:off x="1065212" y="3217031"/>
-            <a:ext cx="4876800" cy="3139321"/>
+            <a:off x="6475412" y="1371600"/>
+            <a:ext cx="4419600" cy="5170646"/>
           </a:xfrm>
           <a:prstGeom prst="rect">
             <a:avLst/>
@@ -12561,6 +13383,70 @@
           </a:p>
           <a:p>
             <a:r>
+              <a:rPr lang="en-US" dirty="0">
+                <a:solidFill>
+                  <a:schemeClr val="tx1"/>
+                </a:solidFill>
+              </a:rPr>
+              <a:t>    </a:t>
+            </a:r>
+            <a:r>
+              <a:rPr lang="en-US" dirty="0" err="1">
+                <a:solidFill>
+                  <a:schemeClr val="tx1"/>
+                </a:solidFill>
+              </a:rPr>
+              <a:t>monthAbbrev</a:t>
+            </a:r>
+            <a:r>
+              <a:rPr lang="en-US" dirty="0">
+                <a:solidFill>
+                  <a:schemeClr val="tx1"/>
+                </a:solidFill>
+              </a:rPr>
+              <a:t> = </a:t>
+            </a:r>
+            <a:r>
+              <a:rPr lang="en-US" dirty="0">
+                <a:solidFill>
+                  <a:srgbClr val="FF5050"/>
+                </a:solidFill>
+              </a:rPr>
+              <a:t>"Jan"</a:t>
+            </a:r>
+            <a:r>
+              <a:rPr lang="en-US" dirty="0">
+                <a:solidFill>
+                  <a:schemeClr val="tx1"/>
+                </a:solidFill>
+              </a:rPr>
+              <a:t>;</a:t>
+            </a:r>
+          </a:p>
+          <a:p>
+            <a:r>
+              <a:rPr lang="en-US" dirty="0">
+                <a:solidFill>
+                  <a:schemeClr val="tx1"/>
+                </a:solidFill>
+              </a:rPr>
+              <a:t>    </a:t>
+            </a:r>
+            <a:r>
+              <a:rPr lang="en-US" dirty="0"/>
+              <a:t>break</a:t>
+            </a:r>
+            <a:r>
+              <a:rPr lang="en-US" dirty="0">
+                <a:solidFill>
+                  <a:schemeClr val="tx1"/>
+                </a:solidFill>
+              </a:rPr>
+              <a:t>;</a:t>
+            </a:r>
+          </a:p>
+          <a:p>
+            <a:r>
               <a:rPr lang="en-US" dirty="0"/>
               <a:t>  case</a:t>
             </a:r>
@@ -12641,6 +13527,162 @@
               <a:t>    </a:t>
             </a:r>
             <a:r>
+              <a:rPr lang="en-US" dirty="0" err="1">
+                <a:solidFill>
+                  <a:schemeClr val="tx1"/>
+                </a:solidFill>
+              </a:rPr>
+              <a:t>monthAbbrev</a:t>
+            </a:r>
+            <a:r>
+              <a:rPr lang="en-US" dirty="0">
+                <a:solidFill>
+                  <a:schemeClr val="tx1"/>
+                </a:solidFill>
+              </a:rPr>
+              <a:t> = </a:t>
+            </a:r>
+            <a:r>
+              <a:rPr lang="en-US" dirty="0">
+                <a:solidFill>
+                  <a:srgbClr val="FF5050"/>
+                </a:solidFill>
+              </a:rPr>
+              <a:t>"Feb"</a:t>
+            </a:r>
+            <a:r>
+              <a:rPr lang="en-US" dirty="0">
+                <a:solidFill>
+                  <a:schemeClr val="tx1"/>
+                </a:solidFill>
+              </a:rPr>
+              <a:t>;</a:t>
+            </a:r>
+          </a:p>
+          <a:p>
+            <a:r>
+              <a:rPr lang="en-US" dirty="0"/>
+              <a:t>  case</a:t>
+            </a:r>
+            <a:r>
+              <a:rPr lang="en-US" dirty="0">
+                <a:solidFill>
+                  <a:schemeClr val="tx1"/>
+                </a:solidFill>
+              </a:rPr>
+              <a:t> </a:t>
+            </a:r>
+            <a:r>
+              <a:rPr lang="en-US" dirty="0">
+                <a:solidFill>
+                  <a:srgbClr val="99CC00"/>
+                </a:solidFill>
+              </a:rPr>
+              <a:t>3</a:t>
+            </a:r>
+            <a:r>
+              <a:rPr lang="en-US" dirty="0">
+                <a:solidFill>
+                  <a:schemeClr val="tx1"/>
+                </a:solidFill>
+              </a:rPr>
+              <a:t>:</a:t>
+            </a:r>
+          </a:p>
+          <a:p>
+            <a:r>
+              <a:rPr lang="en-US" dirty="0">
+                <a:solidFill>
+                  <a:schemeClr val="tx1"/>
+                </a:solidFill>
+              </a:rPr>
+              <a:t>    </a:t>
+            </a:r>
+            <a:r>
+              <a:rPr lang="en-US" dirty="0" err="1">
+                <a:solidFill>
+                  <a:schemeClr val="tx1"/>
+                </a:solidFill>
+              </a:rPr>
+              <a:t>monthName</a:t>
+            </a:r>
+            <a:r>
+              <a:rPr lang="en-US" dirty="0">
+                <a:solidFill>
+                  <a:schemeClr val="tx1"/>
+                </a:solidFill>
+              </a:rPr>
+              <a:t> = </a:t>
+            </a:r>
+            <a:r>
+              <a:rPr lang="en-US" dirty="0">
+                <a:solidFill>
+                  <a:srgbClr val="FF5050"/>
+                </a:solidFill>
+              </a:rPr>
+              <a:t>"March"</a:t>
+            </a:r>
+            <a:r>
+              <a:rPr lang="en-US" dirty="0">
+                <a:solidFill>
+                  <a:schemeClr val="tx1"/>
+                </a:solidFill>
+              </a:rPr>
+              <a:t>;</a:t>
+            </a:r>
+          </a:p>
+          <a:p>
+            <a:r>
+              <a:rPr lang="en-US" dirty="0">
+                <a:solidFill>
+                  <a:schemeClr val="tx1"/>
+                </a:solidFill>
+              </a:rPr>
+              <a:t>    </a:t>
+            </a:r>
+            <a:r>
+              <a:rPr lang="en-US" dirty="0" err="1">
+                <a:solidFill>
+                  <a:schemeClr val="tx1"/>
+                </a:solidFill>
+              </a:rPr>
+              <a:t>monthAbbrev</a:t>
+            </a:r>
+            <a:r>
+              <a:rPr lang="en-US" dirty="0">
+                <a:solidFill>
+                  <a:schemeClr val="tx1"/>
+                </a:solidFill>
+              </a:rPr>
+              <a:t> = </a:t>
+            </a:r>
+            <a:r>
+              <a:rPr lang="en-US" dirty="0">
+                <a:solidFill>
+                  <a:srgbClr val="FF5050"/>
+                </a:solidFill>
+              </a:rPr>
+              <a:t>"Mar"</a:t>
+            </a:r>
+            <a:r>
+              <a:rPr lang="en-US" dirty="0">
+                <a:solidFill>
+                  <a:schemeClr val="tx1"/>
+                </a:solidFill>
+              </a:rPr>
+              <a:t>;</a:t>
+            </a:r>
+          </a:p>
+          <a:p>
+            <a:r>
+              <a:rPr lang="en-US" dirty="0">
+                <a:solidFill>
+                  <a:schemeClr val="tx1"/>
+                </a:solidFill>
+              </a:rPr>
+              <a:t>    </a:t>
+            </a:r>
+            <a:r>
               <a:rPr lang="en-US" dirty="0"/>
               <a:t>break</a:t>
             </a:r>
@@ -12677,10 +13719,10 @@
       </p:sp>
       <p:sp>
         <p:nvSpPr>
-          <p:cNvPr id="6" name="TextBox 5">
+          <p:cNvPr id="13" name="TextBox 12">
             <a:extLst>
               <a:ext uri="{FF2B5EF4-FFF2-40B4-BE49-F238E27FC236}">
-                <a16:creationId xmlns:a16="http://schemas.microsoft.com/office/drawing/2014/main" id="{333067C2-D3C8-4B2F-9A33-B813FABF0971}"/>
+                <a16:creationId xmlns:a16="http://schemas.microsoft.com/office/drawing/2014/main" id="{569A44AA-0759-40A7-9584-958D4D582E42}"/>
               </a:ext>
             </a:extLst>
           </p:cNvPr>
@@ -12689,8 +13731,8 @@
         </p:nvSpPr>
         <p:spPr>
           <a:xfrm>
-            <a:off x="6329078" y="3217031"/>
-            <a:ext cx="2622834" cy="461665"/>
+            <a:off x="1979612" y="4688025"/>
+            <a:ext cx="4213741" cy="830997"/>
           </a:xfrm>
           <a:prstGeom prst="rect">
             <a:avLst/>
@@ -12698,88 +13740,6 @@
           <a:noFill/>
         </p:spPr>
         <p:txBody>
-          <a:bodyPr wrap="none" rtlCol="0">
-            <a:spAutoFit/>
-          </a:bodyPr>
-          <a:lstStyle/>
-          <a:p>
-            <a:r>
-              <a:rPr lang="en-US" dirty="0">
-                <a:latin typeface="Consolas" panose="020B0609020204030204" pitchFamily="49" charset="0"/>
-              </a:rPr>
-              <a:t>month</a:t>
-            </a:r>
-            <a:r>
-              <a:rPr lang="en-US" dirty="0"/>
-              <a:t> is equal to 1</a:t>
-            </a:r>
-          </a:p>
-        </p:txBody>
-      </p:sp>
-      <p:sp>
-        <p:nvSpPr>
-          <p:cNvPr id="7" name="TextBox 6">
-            <a:extLst>
-              <a:ext uri="{FF2B5EF4-FFF2-40B4-BE49-F238E27FC236}">
-                <a16:creationId xmlns:a16="http://schemas.microsoft.com/office/drawing/2014/main" id="{D6801A6D-A5DA-497B-8AA1-23CD4A759D32}"/>
-              </a:ext>
-            </a:extLst>
-          </p:cNvPr>
-          <p:cNvSpPr txBox="1"/>
-          <p:nvPr/>
-        </p:nvSpPr>
-        <p:spPr>
-          <a:xfrm>
-            <a:off x="6329078" y="3886200"/>
-            <a:ext cx="5439310" cy="461665"/>
-          </a:xfrm>
-          <a:prstGeom prst="rect">
-            <a:avLst/>
-          </a:prstGeom>
-          <a:noFill/>
-        </p:spPr>
-        <p:txBody>
-          <a:bodyPr wrap="none" rtlCol="0">
-            <a:spAutoFit/>
-          </a:bodyPr>
-          <a:lstStyle/>
-          <a:p>
-            <a:r>
-              <a:rPr lang="en-US" dirty="0"/>
-              <a:t>Execution starts here since </a:t>
-            </a:r>
-            <a:r>
-              <a:rPr lang="en-US" dirty="0">
-                <a:latin typeface="Consolas" panose="020B0609020204030204" pitchFamily="49" charset="0"/>
-              </a:rPr>
-              <a:t>month == 1</a:t>
-            </a:r>
-          </a:p>
-        </p:txBody>
-      </p:sp>
-      <p:sp>
-        <p:nvSpPr>
-          <p:cNvPr id="8" name="TextBox 7">
-            <a:extLst>
-              <a:ext uri="{FF2B5EF4-FFF2-40B4-BE49-F238E27FC236}">
-                <a16:creationId xmlns:a16="http://schemas.microsoft.com/office/drawing/2014/main" id="{EF1DDC56-7A8C-461E-9686-392B4AC88B49}"/>
-              </a:ext>
-            </a:extLst>
-          </p:cNvPr>
-          <p:cNvSpPr txBox="1"/>
-          <p:nvPr/>
-        </p:nvSpPr>
-        <p:spPr>
-          <a:xfrm>
-            <a:off x="6329078" y="4434401"/>
-            <a:ext cx="4699892" cy="830997"/>
-          </a:xfrm>
-          <a:prstGeom prst="rect">
-            <a:avLst/>
-          </a:prstGeom>
-          <a:noFill/>
-        </p:spPr>
-        <p:txBody>
           <a:bodyPr wrap="square" rtlCol="0">
             <a:spAutoFit/>
           </a:bodyPr>
@@ -12787,109 +13747,17 @@
           <a:p>
             <a:r>
               <a:rPr lang="en-US" dirty="0"/>
-              <a:t>Execution continues, </a:t>
-            </a:r>
-            <a:r>
-              <a:rPr lang="en-US" dirty="0">
-                <a:latin typeface="Consolas" panose="020B0609020204030204" pitchFamily="49" charset="0"/>
-              </a:rPr>
-              <a:t>month == 2</a:t>
-            </a:r>
-            <a:r>
-              <a:rPr lang="en-US" dirty="0"/>
-              <a:t> is not tested</a:t>
+              <a:t>Error! Control cannot continue past the end of a case</a:t>
             </a:r>
           </a:p>
         </p:txBody>
       </p:sp>
       <p:cxnSp>
         <p:nvCxnSpPr>
-          <p:cNvPr id="10" name="Straight Arrow Connector 9">
+          <p:cNvPr id="18" name="Straight Arrow Connector 17">
             <a:extLst>
               <a:ext uri="{FF2B5EF4-FFF2-40B4-BE49-F238E27FC236}">
-                <a16:creationId xmlns:a16="http://schemas.microsoft.com/office/drawing/2014/main" id="{339D1B31-CC75-4C97-9EA7-F5676E2963F3}"/>
-              </a:ext>
-            </a:extLst>
-          </p:cNvPr>
-          <p:cNvCxnSpPr>
-            <a:stCxn id="6" idx="1"/>
-          </p:cNvCxnSpPr>
-          <p:nvPr/>
-        </p:nvCxnSpPr>
-        <p:spPr>
-          <a:xfrm flipH="1" flipV="1">
-            <a:off x="3275012" y="3429000"/>
-            <a:ext cx="3054066" cy="18864"/>
-          </a:xfrm>
-          <a:prstGeom prst="straightConnector1">
-            <a:avLst/>
-          </a:prstGeom>
-          <a:ln>
-            <a:tailEnd type="triangle"/>
-          </a:ln>
-        </p:spPr>
-        <p:style>
-          <a:lnRef idx="2">
-            <a:schemeClr val="accent6"/>
-          </a:lnRef>
-          <a:fillRef idx="0">
-            <a:schemeClr val="accent6"/>
-          </a:fillRef>
-          <a:effectRef idx="1">
-            <a:schemeClr val="accent6"/>
-          </a:effectRef>
-          <a:fontRef idx="minor">
-            <a:schemeClr val="tx1"/>
-          </a:fontRef>
-        </p:style>
-      </p:cxnSp>
-      <p:cxnSp>
-        <p:nvCxnSpPr>
-          <p:cNvPr id="12" name="Straight Arrow Connector 11">
-            <a:extLst>
-              <a:ext uri="{FF2B5EF4-FFF2-40B4-BE49-F238E27FC236}">
-                <a16:creationId xmlns:a16="http://schemas.microsoft.com/office/drawing/2014/main" id="{4C47BB54-0C30-4ED8-8E1E-D4753D185130}"/>
-              </a:ext>
-            </a:extLst>
-          </p:cNvPr>
-          <p:cNvCxnSpPr>
-            <a:stCxn id="7" idx="1"/>
-          </p:cNvCxnSpPr>
-          <p:nvPr/>
-        </p:nvCxnSpPr>
-        <p:spPr>
-          <a:xfrm flipH="1">
-            <a:off x="2665412" y="4117033"/>
-            <a:ext cx="3663666" cy="0"/>
-          </a:xfrm>
-          <a:prstGeom prst="straightConnector1">
-            <a:avLst/>
-          </a:prstGeom>
-          <a:ln>
-            <a:tailEnd type="triangle"/>
-          </a:ln>
-        </p:spPr>
-        <p:style>
-          <a:lnRef idx="2">
-            <a:schemeClr val="accent6"/>
-          </a:lnRef>
-          <a:fillRef idx="0">
-            <a:schemeClr val="accent6"/>
-          </a:fillRef>
-          <a:effectRef idx="1">
-            <a:schemeClr val="accent6"/>
-          </a:effectRef>
-          <a:fontRef idx="minor">
-            <a:schemeClr val="tx1"/>
-          </a:fontRef>
-        </p:style>
-      </p:cxnSp>
-      <p:cxnSp>
-        <p:nvCxnSpPr>
-          <p:cNvPr id="14" name="Straight Arrow Connector 13">
-            <a:extLst>
-              <a:ext uri="{FF2B5EF4-FFF2-40B4-BE49-F238E27FC236}">
-                <a16:creationId xmlns:a16="http://schemas.microsoft.com/office/drawing/2014/main" id="{4B12D08F-6A1E-43AC-9A03-5C3C6542117A}"/>
+                <a16:creationId xmlns:a16="http://schemas.microsoft.com/office/drawing/2014/main" id="{733E2588-4C1C-4967-BAD6-018215C776EA}"/>
               </a:ext>
             </a:extLst>
           </p:cNvPr>
@@ -12899,105 +13767,9 @@
           <p:nvPr/>
         </p:nvCxnSpPr>
         <p:spPr>
-          <a:xfrm flipH="1">
-            <a:off x="2665412" y="4724400"/>
-            <a:ext cx="3581400" cy="0"/>
-          </a:xfrm>
-          <a:prstGeom prst="straightConnector1">
-            <a:avLst/>
-          </a:prstGeom>
-          <a:ln>
-            <a:tailEnd type="triangle"/>
-          </a:ln>
-        </p:spPr>
-        <p:style>
-          <a:lnRef idx="2">
-            <a:schemeClr val="accent6"/>
-          </a:lnRef>
-          <a:fillRef idx="0">
-            <a:schemeClr val="accent6"/>
-          </a:fillRef>
-          <a:effectRef idx="1">
-            <a:schemeClr val="accent6"/>
-          </a:effectRef>
-          <a:fontRef idx="minor">
-            <a:schemeClr val="tx1"/>
-          </a:fontRef>
-        </p:style>
-      </p:cxnSp>
-      <p:sp>
-        <p:nvSpPr>
-          <p:cNvPr id="17" name="TextBox 16">
-            <a:extLst>
-              <a:ext uri="{FF2B5EF4-FFF2-40B4-BE49-F238E27FC236}">
-                <a16:creationId xmlns:a16="http://schemas.microsoft.com/office/drawing/2014/main" id="{D2BCD032-B5C0-4F1A-A98C-1314FBC786AC}"/>
-              </a:ext>
-            </a:extLst>
-          </p:cNvPr>
-          <p:cNvSpPr txBox="1"/>
-          <p:nvPr/>
-        </p:nvSpPr>
-        <p:spPr>
-          <a:xfrm>
-            <a:off x="6329078" y="5351934"/>
-            <a:ext cx="4946934" cy="830997"/>
-          </a:xfrm>
-          <a:prstGeom prst="rect">
-            <a:avLst/>
-          </a:prstGeom>
-          <a:noFill/>
-        </p:spPr>
-        <p:txBody>
-          <a:bodyPr wrap="square" rtlCol="0">
-            <a:spAutoFit/>
-          </a:bodyPr>
-          <a:lstStyle/>
-          <a:p>
-            <a:r>
-              <a:rPr lang="en-US" dirty="0"/>
-              <a:t>Execution stops at </a:t>
-            </a:r>
-            <a:r>
-              <a:rPr lang="en-US" dirty="0">
-                <a:latin typeface="Consolas" panose="020B0609020204030204" pitchFamily="49" charset="0"/>
-              </a:rPr>
-              <a:t>break</a:t>
-            </a:r>
-            <a:r>
-              <a:rPr lang="en-US" dirty="0"/>
-              <a:t> statement, </a:t>
-            </a:r>
-            <a:r>
-              <a:rPr lang="en-US" dirty="0" err="1">
-                <a:latin typeface="Consolas" panose="020B0609020204030204" pitchFamily="49" charset="0"/>
-              </a:rPr>
-              <a:t>monthName</a:t>
-            </a:r>
-            <a:r>
-              <a:rPr lang="en-US" dirty="0"/>
-              <a:t> is “February” </a:t>
-            </a:r>
-          </a:p>
-        </p:txBody>
-      </p:sp>
-      <p:cxnSp>
-        <p:nvCxnSpPr>
-          <p:cNvPr id="19" name="Straight Arrow Connector 18">
-            <a:extLst>
-              <a:ext uri="{FF2B5EF4-FFF2-40B4-BE49-F238E27FC236}">
-                <a16:creationId xmlns:a16="http://schemas.microsoft.com/office/drawing/2014/main" id="{AE10ED52-EEF1-4DB3-93D2-776E9E832E26}"/>
-              </a:ext>
-            </a:extLst>
-          </p:cNvPr>
-          <p:cNvCxnSpPr>
-            <a:cxnSpLocks/>
-          </p:cNvCxnSpPr>
-          <p:nvPr/>
-        </p:nvCxnSpPr>
-        <p:spPr>
-          <a:xfrm flipH="1" flipV="1">
-            <a:off x="2817812" y="5464949"/>
-            <a:ext cx="3429000" cy="59178"/>
+          <a:xfrm flipV="1">
+            <a:off x="6094412" y="4419600"/>
+            <a:ext cx="990600" cy="457200"/>
           </a:xfrm>
           <a:prstGeom prst="straightConnector1">
             <a:avLst/>
@@ -13104,7 +13876,7 @@
         <p:spPr>
           <a:xfrm>
             <a:off x="227013" y="1371600"/>
-            <a:ext cx="6095999" cy="4832092"/>
+            <a:ext cx="7151444" cy="4832092"/>
           </a:xfrm>
         </p:spPr>
         <p:txBody>
@@ -13113,20 +13885,47 @@
           <a:p>
             <a:r>
               <a:rPr lang="en-US" dirty="0"/>
-              <a:t>Can “combine” cases that should have the same behavior</a:t>
-            </a:r>
-          </a:p>
-          <a:p>
-            <a:r>
-              <a:rPr lang="en-US" dirty="0"/>
-              <a:t>Regardless of which case matches, execution continues until the next </a:t>
+              <a:t>A </a:t>
             </a:r>
             <a:r>
               <a:rPr lang="en-US" dirty="0">
                 <a:latin typeface="Consolas" panose="020B0609020204030204" pitchFamily="49" charset="0"/>
               </a:rPr>
+              <a:t>case</a:t>
+            </a:r>
+            <a:r>
+              <a:rPr lang="en-US" dirty="0"/>
+              <a:t> with </a:t>
+            </a:r>
+            <a:r>
+              <a:rPr lang="en-US" b="1" dirty="0"/>
+              <a:t>no body</a:t>
+            </a:r>
+            <a:r>
+              <a:rPr lang="en-US" dirty="0"/>
+              <a:t> doesn’t need a </a:t>
+            </a:r>
+            <a:r>
+              <a:rPr lang="en-US" dirty="0">
+                <a:latin typeface="Consolas" panose="020B0609020204030204" pitchFamily="49" charset="0"/>
+              </a:rPr>
               <a:t>break</a:t>
             </a:r>
+          </a:p>
+          <a:p>
+            <a:r>
+              <a:rPr lang="en-US" dirty="0"/>
+              <a:t>“Combine” cases that should have the same behavior</a:t>
+            </a:r>
+          </a:p>
+          <a:p>
+            <a:r>
+              <a:rPr lang="en-US" dirty="0"/>
+              <a:t>Regardless of which case matches, same code block executes</a:t>
+            </a:r>
+            <a:endParaRPr lang="en-US" dirty="0">
+              <a:latin typeface="Consolas" panose="020B0609020204030204" pitchFamily="49" charset="0"/>
+            </a:endParaRPr>
           </a:p>
           <a:p>
             <a:r>
@@ -13191,8 +13990,8 @@
         </p:nvSpPr>
         <p:spPr>
           <a:xfrm>
-            <a:off x="6780212" y="1371600"/>
-            <a:ext cx="4876800" cy="4832092"/>
+            <a:off x="7514342" y="1371600"/>
+            <a:ext cx="4343400" cy="4832092"/>
           </a:xfrm>
           <a:prstGeom prst="rect">
             <a:avLst/>
@@ -13551,6 +14350,90 @@
           </a:p>
         </p:txBody>
       </p:sp>
+      <p:sp>
+        <p:nvSpPr>
+          <p:cNvPr id="8" name="TextBox 7">
+            <a:extLst>
+              <a:ext uri="{FF2B5EF4-FFF2-40B4-BE49-F238E27FC236}">
+                <a16:creationId xmlns:a16="http://schemas.microsoft.com/office/drawing/2014/main" id="{F3CA08CA-3876-4AED-B946-DFD9CF247AA3}"/>
+              </a:ext>
+            </a:extLst>
+          </p:cNvPr>
+          <p:cNvSpPr txBox="1"/>
+          <p:nvPr/>
+        </p:nvSpPr>
+        <p:spPr>
+          <a:xfrm>
+            <a:off x="10028942" y="1905000"/>
+            <a:ext cx="1964685" cy="830997"/>
+          </a:xfrm>
+          <a:prstGeom prst="rect">
+            <a:avLst/>
+          </a:prstGeom>
+          <a:noFill/>
+        </p:spPr>
+        <p:txBody>
+          <a:bodyPr wrap="square" rtlCol="0">
+            <a:spAutoFit/>
+          </a:bodyPr>
+          <a:lstStyle/>
+          <a:p>
+            <a:r>
+              <a:rPr lang="en-US" dirty="0"/>
+              <a:t>No </a:t>
+            </a:r>
+            <a:r>
+              <a:rPr lang="en-US" dirty="0">
+                <a:latin typeface="Consolas" panose="020B0609020204030204" pitchFamily="49" charset="0"/>
+              </a:rPr>
+              <a:t>break</a:t>
+            </a:r>
+            <a:r>
+              <a:rPr lang="en-US" dirty="0"/>
+              <a:t>, not an error</a:t>
+            </a:r>
+          </a:p>
+        </p:txBody>
+      </p:sp>
+      <p:cxnSp>
+        <p:nvCxnSpPr>
+          <p:cNvPr id="10" name="Straight Arrow Connector 9">
+            <a:extLst>
+              <a:ext uri="{FF2B5EF4-FFF2-40B4-BE49-F238E27FC236}">
+                <a16:creationId xmlns:a16="http://schemas.microsoft.com/office/drawing/2014/main" id="{CCFE958F-BE2D-483A-A4BD-DE3745A983C6}"/>
+              </a:ext>
+            </a:extLst>
+          </p:cNvPr>
+          <p:cNvCxnSpPr/>
+          <p:nvPr/>
+        </p:nvCxnSpPr>
+        <p:spPr>
+          <a:xfrm flipH="1">
+            <a:off x="9038342" y="2286000"/>
+            <a:ext cx="990600" cy="152400"/>
+          </a:xfrm>
+          <a:prstGeom prst="straightConnector1">
+            <a:avLst/>
+          </a:prstGeom>
+          <a:ln>
+            <a:tailEnd type="triangle"/>
+          </a:ln>
+        </p:spPr>
+        <p:style>
+          <a:lnRef idx="2">
+            <a:schemeClr val="accent6"/>
+          </a:lnRef>
+          <a:fillRef idx="0">
+            <a:schemeClr val="accent6"/>
+          </a:fillRef>
+          <a:effectRef idx="1">
+            <a:schemeClr val="accent6"/>
+          </a:effectRef>
+          <a:fontRef idx="minor">
+            <a:schemeClr val="tx1"/>
+          </a:fontRef>
+        </p:style>
+      </p:cxnSp>
     </p:spTree>
     <p:extLst>
       <p:ext uri="{BB962C8B-B14F-4D97-AF65-F5344CB8AC3E}">

</xml_diff>